<commit_message>
Add solution for LCD exercise
</commit_message>
<xml_diff>
--- a/Vorlesung/5 Embedded Systems.pptx
+++ b/Vorlesung/5 Embedded Systems.pptx
@@ -6,7 +6,7 @@
     <p:sldMasterId id="2147483649" r:id="rId2"/>
   </p:sldMasterIdLst>
   <p:notesMasterIdLst>
-    <p:notesMasterId r:id="rId12"/>
+    <p:notesMasterId r:id="rId14"/>
   </p:notesMasterIdLst>
   <p:sldIdLst>
     <p:sldId id="256" r:id="rId3"/>
@@ -17,7 +17,9 @@
     <p:sldId id="261" r:id="rId8"/>
     <p:sldId id="262" r:id="rId9"/>
     <p:sldId id="263" r:id="rId10"/>
-    <p:sldId id="264" r:id="rId11"/>
+    <p:sldId id="265" r:id="rId11"/>
+    <p:sldId id="264" r:id="rId12"/>
+    <p:sldId id="266" r:id="rId13"/>
   </p:sldIdLst>
   <p:sldSz cx="9144000" cy="6858000" type="screen4x3"/>
   <p:notesSz cx="6732588" cy="9856788"/>
@@ -2056,6 +2058,1524 @@
 </p:notes>
 </file>
 
+<file path=ppt/notesSlides/notesSlide10.xml><?xml version="1.0" encoding="utf-8"?>
+<p:notes xmlns:a="http://schemas.openxmlformats.org/drawingml/2006/main" xmlns:r="http://schemas.openxmlformats.org/officeDocument/2006/relationships" xmlns:p="http://schemas.openxmlformats.org/presentationml/2006/main">
+  <p:cSld>
+    <p:bg>
+      <p:bgPr>
+        <a:solidFill>
+          <a:srgbClr val="FFFFFF"/>
+        </a:solidFill>
+        <a:effectLst/>
+      </p:bgPr>
+    </p:bg>
+    <p:spTree>
+      <p:nvGrpSpPr>
+        <p:cNvPr id="1" name=""/>
+        <p:cNvGrpSpPr/>
+        <p:nvPr/>
+      </p:nvGrpSpPr>
+      <p:grpSpPr>
+        <a:xfrm>
+          <a:off x="0" y="0"/>
+          <a:ext cx="0" cy="0"/>
+          <a:chOff x="0" y="0"/>
+          <a:chExt cx="0" cy="0"/>
+        </a:xfrm>
+      </p:grpSpPr>
+      <p:sp>
+        <p:nvSpPr>
+          <p:cNvPr id="21506" name="Rectangle 4"/>
+          <p:cNvSpPr>
+            <a:spLocks noGrp="1" noChangeArrowheads="1"/>
+          </p:cNvSpPr>
+          <p:nvPr>
+            <p:ph type="dt" sz="quarter"/>
+          </p:nvPr>
+        </p:nvSpPr>
+        <p:spPr>
+          <a:noFill/>
+        </p:spPr>
+        <p:txBody>
+          <a:bodyPr/>
+          <a:lstStyle>
+            <a:lvl1pPr eaLnBrk="0" hangingPunct="0">
+              <a:tabLst>
+                <a:tab pos="723900" algn="l"/>
+                <a:tab pos="1447800" algn="l"/>
+              </a:tabLst>
+              <a:defRPr sz="2400">
+                <a:solidFill>
+                  <a:schemeClr val="bg1"/>
+                </a:solidFill>
+                <a:latin typeface="Arial" charset="0"/>
+                <a:ea typeface="ＭＳ Ｐゴシック" charset="-128"/>
+              </a:defRPr>
+            </a:lvl1pPr>
+            <a:lvl2pPr eaLnBrk="0" hangingPunct="0">
+              <a:tabLst>
+                <a:tab pos="723900" algn="l"/>
+                <a:tab pos="1447800" algn="l"/>
+              </a:tabLst>
+              <a:defRPr sz="2400">
+                <a:solidFill>
+                  <a:schemeClr val="bg1"/>
+                </a:solidFill>
+                <a:latin typeface="Arial" charset="0"/>
+                <a:ea typeface="ＭＳ Ｐゴシック" charset="-128"/>
+              </a:defRPr>
+            </a:lvl2pPr>
+            <a:lvl3pPr eaLnBrk="0" hangingPunct="0">
+              <a:tabLst>
+                <a:tab pos="723900" algn="l"/>
+                <a:tab pos="1447800" algn="l"/>
+              </a:tabLst>
+              <a:defRPr sz="2400">
+                <a:solidFill>
+                  <a:schemeClr val="bg1"/>
+                </a:solidFill>
+                <a:latin typeface="Arial" charset="0"/>
+                <a:ea typeface="ＭＳ Ｐゴシック" charset="-128"/>
+              </a:defRPr>
+            </a:lvl3pPr>
+            <a:lvl4pPr eaLnBrk="0" hangingPunct="0">
+              <a:tabLst>
+                <a:tab pos="723900" algn="l"/>
+                <a:tab pos="1447800" algn="l"/>
+              </a:tabLst>
+              <a:defRPr sz="2400">
+                <a:solidFill>
+                  <a:schemeClr val="bg1"/>
+                </a:solidFill>
+                <a:latin typeface="Arial" charset="0"/>
+                <a:ea typeface="ＭＳ Ｐゴシック" charset="-128"/>
+              </a:defRPr>
+            </a:lvl4pPr>
+            <a:lvl5pPr eaLnBrk="0" hangingPunct="0">
+              <a:tabLst>
+                <a:tab pos="723900" algn="l"/>
+                <a:tab pos="1447800" algn="l"/>
+              </a:tabLst>
+              <a:defRPr sz="2400">
+                <a:solidFill>
+                  <a:schemeClr val="bg1"/>
+                </a:solidFill>
+                <a:latin typeface="Arial" charset="0"/>
+                <a:ea typeface="ＭＳ Ｐゴシック" charset="-128"/>
+              </a:defRPr>
+            </a:lvl5pPr>
+            <a:lvl6pPr marL="2514600" indent="-228600" algn="ctr" defTabSz="449263" eaLnBrk="0" fontAlgn="base" hangingPunct="0">
+              <a:lnSpc>
+                <a:spcPct val="93000"/>
+              </a:lnSpc>
+              <a:spcBef>
+                <a:spcPct val="0"/>
+              </a:spcBef>
+              <a:spcAft>
+                <a:spcPct val="0"/>
+              </a:spcAft>
+              <a:buClr>
+                <a:srgbClr val="000000"/>
+              </a:buClr>
+              <a:buSzPct val="100000"/>
+              <a:buFont typeface="Times New Roman" pitchFamily="16" charset="0"/>
+              <a:tabLst>
+                <a:tab pos="723900" algn="l"/>
+                <a:tab pos="1447800" algn="l"/>
+              </a:tabLst>
+              <a:defRPr sz="2400">
+                <a:solidFill>
+                  <a:schemeClr val="bg1"/>
+                </a:solidFill>
+                <a:latin typeface="Arial" charset="0"/>
+                <a:ea typeface="ＭＳ Ｐゴシック" charset="-128"/>
+              </a:defRPr>
+            </a:lvl6pPr>
+            <a:lvl7pPr marL="2971800" indent="-228600" algn="ctr" defTabSz="449263" eaLnBrk="0" fontAlgn="base" hangingPunct="0">
+              <a:lnSpc>
+                <a:spcPct val="93000"/>
+              </a:lnSpc>
+              <a:spcBef>
+                <a:spcPct val="0"/>
+              </a:spcBef>
+              <a:spcAft>
+                <a:spcPct val="0"/>
+              </a:spcAft>
+              <a:buClr>
+                <a:srgbClr val="000000"/>
+              </a:buClr>
+              <a:buSzPct val="100000"/>
+              <a:buFont typeface="Times New Roman" pitchFamily="16" charset="0"/>
+              <a:tabLst>
+                <a:tab pos="723900" algn="l"/>
+                <a:tab pos="1447800" algn="l"/>
+              </a:tabLst>
+              <a:defRPr sz="2400">
+                <a:solidFill>
+                  <a:schemeClr val="bg1"/>
+                </a:solidFill>
+                <a:latin typeface="Arial" charset="0"/>
+                <a:ea typeface="ＭＳ Ｐゴシック" charset="-128"/>
+              </a:defRPr>
+            </a:lvl7pPr>
+            <a:lvl8pPr marL="3429000" indent="-228600" algn="ctr" defTabSz="449263" eaLnBrk="0" fontAlgn="base" hangingPunct="0">
+              <a:lnSpc>
+                <a:spcPct val="93000"/>
+              </a:lnSpc>
+              <a:spcBef>
+                <a:spcPct val="0"/>
+              </a:spcBef>
+              <a:spcAft>
+                <a:spcPct val="0"/>
+              </a:spcAft>
+              <a:buClr>
+                <a:srgbClr val="000000"/>
+              </a:buClr>
+              <a:buSzPct val="100000"/>
+              <a:buFont typeface="Times New Roman" pitchFamily="16" charset="0"/>
+              <a:tabLst>
+                <a:tab pos="723900" algn="l"/>
+                <a:tab pos="1447800" algn="l"/>
+              </a:tabLst>
+              <a:defRPr sz="2400">
+                <a:solidFill>
+                  <a:schemeClr val="bg1"/>
+                </a:solidFill>
+                <a:latin typeface="Arial" charset="0"/>
+                <a:ea typeface="ＭＳ Ｐゴシック" charset="-128"/>
+              </a:defRPr>
+            </a:lvl8pPr>
+            <a:lvl9pPr marL="3886200" indent="-228600" algn="ctr" defTabSz="449263" eaLnBrk="0" fontAlgn="base" hangingPunct="0">
+              <a:lnSpc>
+                <a:spcPct val="93000"/>
+              </a:lnSpc>
+              <a:spcBef>
+                <a:spcPct val="0"/>
+              </a:spcBef>
+              <a:spcAft>
+                <a:spcPct val="0"/>
+              </a:spcAft>
+              <a:buClr>
+                <a:srgbClr val="000000"/>
+              </a:buClr>
+              <a:buSzPct val="100000"/>
+              <a:buFont typeface="Times New Roman" pitchFamily="16" charset="0"/>
+              <a:tabLst>
+                <a:tab pos="723900" algn="l"/>
+                <a:tab pos="1447800" algn="l"/>
+              </a:tabLst>
+              <a:defRPr sz="2400">
+                <a:solidFill>
+                  <a:schemeClr val="bg1"/>
+                </a:solidFill>
+                <a:latin typeface="Arial" charset="0"/>
+                <a:ea typeface="ＭＳ Ｐゴシック" charset="-128"/>
+              </a:defRPr>
+            </a:lvl9pPr>
+          </a:lstStyle>
+          <a:p>
+            <a:pPr eaLnBrk="1" hangingPunct="1"/>
+            <a:r>
+              <a:rPr lang="en-US" altLang="de-DE" sz="1100">
+                <a:solidFill>
+                  <a:srgbClr val="000000"/>
+                </a:solidFill>
+                <a:latin typeface="Stafford" charset="0"/>
+              </a:rPr>
+              <a:t>November 19, 2007</a:t>
+            </a:r>
+          </a:p>
+        </p:txBody>
+      </p:sp>
+      <p:sp>
+        <p:nvSpPr>
+          <p:cNvPr id="21507" name="Rectangle 7"/>
+          <p:cNvSpPr>
+            <a:spLocks noGrp="1" noChangeArrowheads="1"/>
+          </p:cNvSpPr>
+          <p:nvPr>
+            <p:ph type="ftr" sz="quarter"/>
+          </p:nvPr>
+        </p:nvSpPr>
+        <p:spPr>
+          <a:noFill/>
+        </p:spPr>
+        <p:txBody>
+          <a:bodyPr/>
+          <a:lstStyle>
+            <a:lvl1pPr eaLnBrk="0" hangingPunct="0">
+              <a:tabLst>
+                <a:tab pos="723900" algn="l"/>
+                <a:tab pos="1447800" algn="l"/>
+                <a:tab pos="2171700" algn="l"/>
+                <a:tab pos="2895600" algn="l"/>
+                <a:tab pos="3619500" algn="l"/>
+              </a:tabLst>
+              <a:defRPr sz="2400">
+                <a:solidFill>
+                  <a:schemeClr val="bg1"/>
+                </a:solidFill>
+                <a:latin typeface="Arial" charset="0"/>
+                <a:ea typeface="ＭＳ Ｐゴシック" charset="-128"/>
+              </a:defRPr>
+            </a:lvl1pPr>
+            <a:lvl2pPr eaLnBrk="0" hangingPunct="0">
+              <a:tabLst>
+                <a:tab pos="723900" algn="l"/>
+                <a:tab pos="1447800" algn="l"/>
+                <a:tab pos="2171700" algn="l"/>
+                <a:tab pos="2895600" algn="l"/>
+                <a:tab pos="3619500" algn="l"/>
+              </a:tabLst>
+              <a:defRPr sz="2400">
+                <a:solidFill>
+                  <a:schemeClr val="bg1"/>
+                </a:solidFill>
+                <a:latin typeface="Arial" charset="0"/>
+                <a:ea typeface="ＭＳ Ｐゴシック" charset="-128"/>
+              </a:defRPr>
+            </a:lvl2pPr>
+            <a:lvl3pPr eaLnBrk="0" hangingPunct="0">
+              <a:tabLst>
+                <a:tab pos="723900" algn="l"/>
+                <a:tab pos="1447800" algn="l"/>
+                <a:tab pos="2171700" algn="l"/>
+                <a:tab pos="2895600" algn="l"/>
+                <a:tab pos="3619500" algn="l"/>
+              </a:tabLst>
+              <a:defRPr sz="2400">
+                <a:solidFill>
+                  <a:schemeClr val="bg1"/>
+                </a:solidFill>
+                <a:latin typeface="Arial" charset="0"/>
+                <a:ea typeface="ＭＳ Ｐゴシック" charset="-128"/>
+              </a:defRPr>
+            </a:lvl3pPr>
+            <a:lvl4pPr eaLnBrk="0" hangingPunct="0">
+              <a:tabLst>
+                <a:tab pos="723900" algn="l"/>
+                <a:tab pos="1447800" algn="l"/>
+                <a:tab pos="2171700" algn="l"/>
+                <a:tab pos="2895600" algn="l"/>
+                <a:tab pos="3619500" algn="l"/>
+              </a:tabLst>
+              <a:defRPr sz="2400">
+                <a:solidFill>
+                  <a:schemeClr val="bg1"/>
+                </a:solidFill>
+                <a:latin typeface="Arial" charset="0"/>
+                <a:ea typeface="ＭＳ Ｐゴシック" charset="-128"/>
+              </a:defRPr>
+            </a:lvl4pPr>
+            <a:lvl5pPr eaLnBrk="0" hangingPunct="0">
+              <a:tabLst>
+                <a:tab pos="723900" algn="l"/>
+                <a:tab pos="1447800" algn="l"/>
+                <a:tab pos="2171700" algn="l"/>
+                <a:tab pos="2895600" algn="l"/>
+                <a:tab pos="3619500" algn="l"/>
+              </a:tabLst>
+              <a:defRPr sz="2400">
+                <a:solidFill>
+                  <a:schemeClr val="bg1"/>
+                </a:solidFill>
+                <a:latin typeface="Arial" charset="0"/>
+                <a:ea typeface="ＭＳ Ｐゴシック" charset="-128"/>
+              </a:defRPr>
+            </a:lvl5pPr>
+            <a:lvl6pPr marL="2514600" indent="-228600" algn="ctr" defTabSz="449263" eaLnBrk="0" fontAlgn="base" hangingPunct="0">
+              <a:lnSpc>
+                <a:spcPct val="93000"/>
+              </a:lnSpc>
+              <a:spcBef>
+                <a:spcPct val="0"/>
+              </a:spcBef>
+              <a:spcAft>
+                <a:spcPct val="0"/>
+              </a:spcAft>
+              <a:buClr>
+                <a:srgbClr val="000000"/>
+              </a:buClr>
+              <a:buSzPct val="100000"/>
+              <a:buFont typeface="Times New Roman" pitchFamily="16" charset="0"/>
+              <a:tabLst>
+                <a:tab pos="723900" algn="l"/>
+                <a:tab pos="1447800" algn="l"/>
+                <a:tab pos="2171700" algn="l"/>
+                <a:tab pos="2895600" algn="l"/>
+                <a:tab pos="3619500" algn="l"/>
+              </a:tabLst>
+              <a:defRPr sz="2400">
+                <a:solidFill>
+                  <a:schemeClr val="bg1"/>
+                </a:solidFill>
+                <a:latin typeface="Arial" charset="0"/>
+                <a:ea typeface="ＭＳ Ｐゴシック" charset="-128"/>
+              </a:defRPr>
+            </a:lvl6pPr>
+            <a:lvl7pPr marL="2971800" indent="-228600" algn="ctr" defTabSz="449263" eaLnBrk="0" fontAlgn="base" hangingPunct="0">
+              <a:lnSpc>
+                <a:spcPct val="93000"/>
+              </a:lnSpc>
+              <a:spcBef>
+                <a:spcPct val="0"/>
+              </a:spcBef>
+              <a:spcAft>
+                <a:spcPct val="0"/>
+              </a:spcAft>
+              <a:buClr>
+                <a:srgbClr val="000000"/>
+              </a:buClr>
+              <a:buSzPct val="100000"/>
+              <a:buFont typeface="Times New Roman" pitchFamily="16" charset="0"/>
+              <a:tabLst>
+                <a:tab pos="723900" algn="l"/>
+                <a:tab pos="1447800" algn="l"/>
+                <a:tab pos="2171700" algn="l"/>
+                <a:tab pos="2895600" algn="l"/>
+                <a:tab pos="3619500" algn="l"/>
+              </a:tabLst>
+              <a:defRPr sz="2400">
+                <a:solidFill>
+                  <a:schemeClr val="bg1"/>
+                </a:solidFill>
+                <a:latin typeface="Arial" charset="0"/>
+                <a:ea typeface="ＭＳ Ｐゴシック" charset="-128"/>
+              </a:defRPr>
+            </a:lvl7pPr>
+            <a:lvl8pPr marL="3429000" indent="-228600" algn="ctr" defTabSz="449263" eaLnBrk="0" fontAlgn="base" hangingPunct="0">
+              <a:lnSpc>
+                <a:spcPct val="93000"/>
+              </a:lnSpc>
+              <a:spcBef>
+                <a:spcPct val="0"/>
+              </a:spcBef>
+              <a:spcAft>
+                <a:spcPct val="0"/>
+              </a:spcAft>
+              <a:buClr>
+                <a:srgbClr val="000000"/>
+              </a:buClr>
+              <a:buSzPct val="100000"/>
+              <a:buFont typeface="Times New Roman" pitchFamily="16" charset="0"/>
+              <a:tabLst>
+                <a:tab pos="723900" algn="l"/>
+                <a:tab pos="1447800" algn="l"/>
+                <a:tab pos="2171700" algn="l"/>
+                <a:tab pos="2895600" algn="l"/>
+                <a:tab pos="3619500" algn="l"/>
+              </a:tabLst>
+              <a:defRPr sz="2400">
+                <a:solidFill>
+                  <a:schemeClr val="bg1"/>
+                </a:solidFill>
+                <a:latin typeface="Arial" charset="0"/>
+                <a:ea typeface="ＭＳ Ｐゴシック" charset="-128"/>
+              </a:defRPr>
+            </a:lvl8pPr>
+            <a:lvl9pPr marL="3886200" indent="-228600" algn="ctr" defTabSz="449263" eaLnBrk="0" fontAlgn="base" hangingPunct="0">
+              <a:lnSpc>
+                <a:spcPct val="93000"/>
+              </a:lnSpc>
+              <a:spcBef>
+                <a:spcPct val="0"/>
+              </a:spcBef>
+              <a:spcAft>
+                <a:spcPct val="0"/>
+              </a:spcAft>
+              <a:buClr>
+                <a:srgbClr val="000000"/>
+              </a:buClr>
+              <a:buSzPct val="100000"/>
+              <a:buFont typeface="Times New Roman" pitchFamily="16" charset="0"/>
+              <a:tabLst>
+                <a:tab pos="723900" algn="l"/>
+                <a:tab pos="1447800" algn="l"/>
+                <a:tab pos="2171700" algn="l"/>
+                <a:tab pos="2895600" algn="l"/>
+                <a:tab pos="3619500" algn="l"/>
+              </a:tabLst>
+              <a:defRPr sz="2400">
+                <a:solidFill>
+                  <a:schemeClr val="bg1"/>
+                </a:solidFill>
+                <a:latin typeface="Arial" charset="0"/>
+                <a:ea typeface="ＭＳ Ｐゴシック" charset="-128"/>
+              </a:defRPr>
+            </a:lvl9pPr>
+          </a:lstStyle>
+          <a:p>
+            <a:pPr eaLnBrk="1" hangingPunct="1"/>
+            <a:r>
+              <a:rPr lang="en-US" altLang="de-DE" sz="1100">
+                <a:solidFill>
+                  <a:srgbClr val="000000"/>
+                </a:solidFill>
+                <a:latin typeface="Stafford" charset="0"/>
+              </a:rPr>
+              <a:t>|  </a:t>
+            </a:r>
+          </a:p>
+        </p:txBody>
+      </p:sp>
+      <p:sp>
+        <p:nvSpPr>
+          <p:cNvPr id="21508" name="Rectangle 8"/>
+          <p:cNvSpPr>
+            <a:spLocks noGrp="1" noChangeArrowheads="1"/>
+          </p:cNvSpPr>
+          <p:nvPr>
+            <p:ph type="sldNum" sz="quarter"/>
+          </p:nvPr>
+        </p:nvSpPr>
+        <p:spPr>
+          <a:noFill/>
+        </p:spPr>
+        <p:txBody>
+          <a:bodyPr/>
+          <a:lstStyle>
+            <a:lvl1pPr eaLnBrk="0" hangingPunct="0">
+              <a:tabLst>
+                <a:tab pos="723900" algn="l"/>
+              </a:tabLst>
+              <a:defRPr sz="2400">
+                <a:solidFill>
+                  <a:schemeClr val="bg1"/>
+                </a:solidFill>
+                <a:latin typeface="Arial" charset="0"/>
+                <a:ea typeface="ＭＳ Ｐゴシック" charset="-128"/>
+              </a:defRPr>
+            </a:lvl1pPr>
+            <a:lvl2pPr eaLnBrk="0" hangingPunct="0">
+              <a:tabLst>
+                <a:tab pos="723900" algn="l"/>
+              </a:tabLst>
+              <a:defRPr sz="2400">
+                <a:solidFill>
+                  <a:schemeClr val="bg1"/>
+                </a:solidFill>
+                <a:latin typeface="Arial" charset="0"/>
+                <a:ea typeface="ＭＳ Ｐゴシック" charset="-128"/>
+              </a:defRPr>
+            </a:lvl2pPr>
+            <a:lvl3pPr eaLnBrk="0" hangingPunct="0">
+              <a:tabLst>
+                <a:tab pos="723900" algn="l"/>
+              </a:tabLst>
+              <a:defRPr sz="2400">
+                <a:solidFill>
+                  <a:schemeClr val="bg1"/>
+                </a:solidFill>
+                <a:latin typeface="Arial" charset="0"/>
+                <a:ea typeface="ＭＳ Ｐゴシック" charset="-128"/>
+              </a:defRPr>
+            </a:lvl3pPr>
+            <a:lvl4pPr eaLnBrk="0" hangingPunct="0">
+              <a:tabLst>
+                <a:tab pos="723900" algn="l"/>
+              </a:tabLst>
+              <a:defRPr sz="2400">
+                <a:solidFill>
+                  <a:schemeClr val="bg1"/>
+                </a:solidFill>
+                <a:latin typeface="Arial" charset="0"/>
+                <a:ea typeface="ＭＳ Ｐゴシック" charset="-128"/>
+              </a:defRPr>
+            </a:lvl4pPr>
+            <a:lvl5pPr eaLnBrk="0" hangingPunct="0">
+              <a:tabLst>
+                <a:tab pos="723900" algn="l"/>
+              </a:tabLst>
+              <a:defRPr sz="2400">
+                <a:solidFill>
+                  <a:schemeClr val="bg1"/>
+                </a:solidFill>
+                <a:latin typeface="Arial" charset="0"/>
+                <a:ea typeface="ＭＳ Ｐゴシック" charset="-128"/>
+              </a:defRPr>
+            </a:lvl5pPr>
+            <a:lvl6pPr marL="2514600" indent="-228600" algn="ctr" defTabSz="449263" eaLnBrk="0" fontAlgn="base" hangingPunct="0">
+              <a:lnSpc>
+                <a:spcPct val="93000"/>
+              </a:lnSpc>
+              <a:spcBef>
+                <a:spcPct val="0"/>
+              </a:spcBef>
+              <a:spcAft>
+                <a:spcPct val="0"/>
+              </a:spcAft>
+              <a:buClr>
+                <a:srgbClr val="000000"/>
+              </a:buClr>
+              <a:buSzPct val="100000"/>
+              <a:buFont typeface="Times New Roman" pitchFamily="16" charset="0"/>
+              <a:tabLst>
+                <a:tab pos="723900" algn="l"/>
+              </a:tabLst>
+              <a:defRPr sz="2400">
+                <a:solidFill>
+                  <a:schemeClr val="bg1"/>
+                </a:solidFill>
+                <a:latin typeface="Arial" charset="0"/>
+                <a:ea typeface="ＭＳ Ｐゴシック" charset="-128"/>
+              </a:defRPr>
+            </a:lvl6pPr>
+            <a:lvl7pPr marL="2971800" indent="-228600" algn="ctr" defTabSz="449263" eaLnBrk="0" fontAlgn="base" hangingPunct="0">
+              <a:lnSpc>
+                <a:spcPct val="93000"/>
+              </a:lnSpc>
+              <a:spcBef>
+                <a:spcPct val="0"/>
+              </a:spcBef>
+              <a:spcAft>
+                <a:spcPct val="0"/>
+              </a:spcAft>
+              <a:buClr>
+                <a:srgbClr val="000000"/>
+              </a:buClr>
+              <a:buSzPct val="100000"/>
+              <a:buFont typeface="Times New Roman" pitchFamily="16" charset="0"/>
+              <a:tabLst>
+                <a:tab pos="723900" algn="l"/>
+              </a:tabLst>
+              <a:defRPr sz="2400">
+                <a:solidFill>
+                  <a:schemeClr val="bg1"/>
+                </a:solidFill>
+                <a:latin typeface="Arial" charset="0"/>
+                <a:ea typeface="ＭＳ Ｐゴシック" charset="-128"/>
+              </a:defRPr>
+            </a:lvl7pPr>
+            <a:lvl8pPr marL="3429000" indent="-228600" algn="ctr" defTabSz="449263" eaLnBrk="0" fontAlgn="base" hangingPunct="0">
+              <a:lnSpc>
+                <a:spcPct val="93000"/>
+              </a:lnSpc>
+              <a:spcBef>
+                <a:spcPct val="0"/>
+              </a:spcBef>
+              <a:spcAft>
+                <a:spcPct val="0"/>
+              </a:spcAft>
+              <a:buClr>
+                <a:srgbClr val="000000"/>
+              </a:buClr>
+              <a:buSzPct val="100000"/>
+              <a:buFont typeface="Times New Roman" pitchFamily="16" charset="0"/>
+              <a:tabLst>
+                <a:tab pos="723900" algn="l"/>
+              </a:tabLst>
+              <a:defRPr sz="2400">
+                <a:solidFill>
+                  <a:schemeClr val="bg1"/>
+                </a:solidFill>
+                <a:latin typeface="Arial" charset="0"/>
+                <a:ea typeface="ＭＳ Ｐゴシック" charset="-128"/>
+              </a:defRPr>
+            </a:lvl8pPr>
+            <a:lvl9pPr marL="3886200" indent="-228600" algn="ctr" defTabSz="449263" eaLnBrk="0" fontAlgn="base" hangingPunct="0">
+              <a:lnSpc>
+                <a:spcPct val="93000"/>
+              </a:lnSpc>
+              <a:spcBef>
+                <a:spcPct val="0"/>
+              </a:spcBef>
+              <a:spcAft>
+                <a:spcPct val="0"/>
+              </a:spcAft>
+              <a:buClr>
+                <a:srgbClr val="000000"/>
+              </a:buClr>
+              <a:buSzPct val="100000"/>
+              <a:buFont typeface="Times New Roman" pitchFamily="16" charset="0"/>
+              <a:tabLst>
+                <a:tab pos="723900" algn="l"/>
+              </a:tabLst>
+              <a:defRPr sz="2400">
+                <a:solidFill>
+                  <a:schemeClr val="bg1"/>
+                </a:solidFill>
+                <a:latin typeface="Arial" charset="0"/>
+                <a:ea typeface="ＭＳ Ｐゴシック" charset="-128"/>
+              </a:defRPr>
+            </a:lvl9pPr>
+          </a:lstStyle>
+          <a:p>
+            <a:pPr eaLnBrk="1" hangingPunct="1"/>
+            <a:r>
+              <a:rPr lang="en-US" altLang="de-DE" sz="1100">
+                <a:solidFill>
+                  <a:srgbClr val="000000"/>
+                </a:solidFill>
+                <a:latin typeface="Stafford" charset="0"/>
+              </a:rPr>
+              <a:t>|  </a:t>
+            </a:r>
+            <a:fld id="{58169C6A-BC63-4DF0-A9C3-BCFA44C84BAD}" type="slidenum">
+              <a:rPr lang="en-US" altLang="de-DE" sz="1100">
+                <a:solidFill>
+                  <a:srgbClr val="000000"/>
+                </a:solidFill>
+                <a:latin typeface="Stafford" charset="0"/>
+              </a:rPr>
+              <a:pPr eaLnBrk="1" hangingPunct="1"/>
+              <a:t>10</a:t>
+            </a:fld>
+            <a:endParaRPr lang="en-US" altLang="de-DE" sz="1100">
+              <a:solidFill>
+                <a:srgbClr val="000000"/>
+              </a:solidFill>
+              <a:latin typeface="Stafford" charset="0"/>
+            </a:endParaRPr>
+          </a:p>
+        </p:txBody>
+      </p:sp>
+      <p:sp>
+        <p:nvSpPr>
+          <p:cNvPr id="21509" name="Rectangle 1"/>
+          <p:cNvSpPr txBox="1">
+            <a:spLocks noGrp="1" noRot="1" noChangeAspect="1" noChangeArrowheads="1" noTextEdit="1"/>
+          </p:cNvSpPr>
+          <p:nvPr>
+            <p:ph type="sldImg"/>
+          </p:nvPr>
+        </p:nvSpPr>
+        <p:spPr>
+          <a:xfrm>
+            <a:off x="1152525" y="996950"/>
+            <a:ext cx="4408488" cy="3306763"/>
+          </a:xfrm>
+          <a:solidFill>
+            <a:srgbClr val="FFFFFF"/>
+          </a:solidFill>
+          <a:ln>
+            <a:solidFill>
+              <a:srgbClr val="000000"/>
+            </a:solidFill>
+            <a:miter lim="800000"/>
+            <a:headEnd/>
+            <a:tailEnd/>
+          </a:ln>
+          <a:extLst>
+            <a:ext uri="{AF507438-7753-43E0-B8FC-AC1667EBCBE1}">
+              <a14:hiddenEffects xmlns:a14="http://schemas.microsoft.com/office/drawing/2010/main">
+                <a:effectLst>
+                  <a:outerShdw dist="35921" dir="2700000" algn="ctr" rotWithShape="0">
+                    <a:srgbClr val="808080"/>
+                  </a:outerShdw>
+                </a:effectLst>
+              </a14:hiddenEffects>
+            </a:ext>
+          </a:extLst>
+        </p:spPr>
+      </p:sp>
+      <p:sp>
+        <p:nvSpPr>
+          <p:cNvPr id="21510" name="Rectangle 2"/>
+          <p:cNvSpPr txBox="1">
+            <a:spLocks noGrp="1" noChangeArrowheads="1"/>
+          </p:cNvSpPr>
+          <p:nvPr>
+            <p:ph type="body" idx="1"/>
+          </p:nvPr>
+        </p:nvSpPr>
+        <p:spPr>
+          <a:xfrm>
+            <a:off x="187325" y="4618038"/>
+            <a:ext cx="6354763" cy="4614862"/>
+          </a:xfrm>
+          <a:noFill/>
+          <a:extLst>
+            <a:ext uri="{AF507438-7753-43E0-B8FC-AC1667EBCBE1}">
+              <a14:hiddenEffects xmlns:a14="http://schemas.microsoft.com/office/drawing/2010/main">
+                <a:effectLst>
+                  <a:outerShdw dist="35921" dir="2700000" algn="ctr" rotWithShape="0">
+                    <a:srgbClr val="808080"/>
+                  </a:outerShdw>
+                </a:effectLst>
+              </a14:hiddenEffects>
+            </a:ext>
+          </a:extLst>
+        </p:spPr>
+        <p:txBody>
+          <a:bodyPr wrap="none" anchor="ctr"/>
+          <a:lstStyle/>
+          <a:p>
+            <a:endParaRPr lang="de-DE" altLang="de-DE" smtClean="0"/>
+          </a:p>
+        </p:txBody>
+      </p:sp>
+    </p:spTree>
+    <p:extLst>
+      <p:ext uri="{BB962C8B-B14F-4D97-AF65-F5344CB8AC3E}">
+        <p14:creationId xmlns:p14="http://schemas.microsoft.com/office/powerpoint/2010/main" val="1228250305"/>
+      </p:ext>
+    </p:extLst>
+  </p:cSld>
+  <p:clrMapOvr>
+    <a:masterClrMapping/>
+  </p:clrMapOvr>
+</p:notes>
+</file>
+
+<file path=ppt/notesSlides/notesSlide11.xml><?xml version="1.0" encoding="utf-8"?>
+<p:notes xmlns:a="http://schemas.openxmlformats.org/drawingml/2006/main" xmlns:r="http://schemas.openxmlformats.org/officeDocument/2006/relationships" xmlns:p="http://schemas.openxmlformats.org/presentationml/2006/main">
+  <p:cSld>
+    <p:bg>
+      <p:bgPr>
+        <a:solidFill>
+          <a:srgbClr val="FFFFFF"/>
+        </a:solidFill>
+        <a:effectLst/>
+      </p:bgPr>
+    </p:bg>
+    <p:spTree>
+      <p:nvGrpSpPr>
+        <p:cNvPr id="1" name=""/>
+        <p:cNvGrpSpPr/>
+        <p:nvPr/>
+      </p:nvGrpSpPr>
+      <p:grpSpPr>
+        <a:xfrm>
+          <a:off x="0" y="0"/>
+          <a:ext cx="0" cy="0"/>
+          <a:chOff x="0" y="0"/>
+          <a:chExt cx="0" cy="0"/>
+        </a:xfrm>
+      </p:grpSpPr>
+      <p:sp>
+        <p:nvSpPr>
+          <p:cNvPr id="21506" name="Rectangle 4"/>
+          <p:cNvSpPr>
+            <a:spLocks noGrp="1" noChangeArrowheads="1"/>
+          </p:cNvSpPr>
+          <p:nvPr>
+            <p:ph type="dt" sz="quarter"/>
+          </p:nvPr>
+        </p:nvSpPr>
+        <p:spPr>
+          <a:noFill/>
+        </p:spPr>
+        <p:txBody>
+          <a:bodyPr/>
+          <a:lstStyle>
+            <a:lvl1pPr eaLnBrk="0" hangingPunct="0">
+              <a:tabLst>
+                <a:tab pos="723900" algn="l"/>
+                <a:tab pos="1447800" algn="l"/>
+              </a:tabLst>
+              <a:defRPr sz="2400">
+                <a:solidFill>
+                  <a:schemeClr val="bg1"/>
+                </a:solidFill>
+                <a:latin typeface="Arial" charset="0"/>
+                <a:ea typeface="ＭＳ Ｐゴシック" charset="-128"/>
+              </a:defRPr>
+            </a:lvl1pPr>
+            <a:lvl2pPr eaLnBrk="0" hangingPunct="0">
+              <a:tabLst>
+                <a:tab pos="723900" algn="l"/>
+                <a:tab pos="1447800" algn="l"/>
+              </a:tabLst>
+              <a:defRPr sz="2400">
+                <a:solidFill>
+                  <a:schemeClr val="bg1"/>
+                </a:solidFill>
+                <a:latin typeface="Arial" charset="0"/>
+                <a:ea typeface="ＭＳ Ｐゴシック" charset="-128"/>
+              </a:defRPr>
+            </a:lvl2pPr>
+            <a:lvl3pPr eaLnBrk="0" hangingPunct="0">
+              <a:tabLst>
+                <a:tab pos="723900" algn="l"/>
+                <a:tab pos="1447800" algn="l"/>
+              </a:tabLst>
+              <a:defRPr sz="2400">
+                <a:solidFill>
+                  <a:schemeClr val="bg1"/>
+                </a:solidFill>
+                <a:latin typeface="Arial" charset="0"/>
+                <a:ea typeface="ＭＳ Ｐゴシック" charset="-128"/>
+              </a:defRPr>
+            </a:lvl3pPr>
+            <a:lvl4pPr eaLnBrk="0" hangingPunct="0">
+              <a:tabLst>
+                <a:tab pos="723900" algn="l"/>
+                <a:tab pos="1447800" algn="l"/>
+              </a:tabLst>
+              <a:defRPr sz="2400">
+                <a:solidFill>
+                  <a:schemeClr val="bg1"/>
+                </a:solidFill>
+                <a:latin typeface="Arial" charset="0"/>
+                <a:ea typeface="ＭＳ Ｐゴシック" charset="-128"/>
+              </a:defRPr>
+            </a:lvl4pPr>
+            <a:lvl5pPr eaLnBrk="0" hangingPunct="0">
+              <a:tabLst>
+                <a:tab pos="723900" algn="l"/>
+                <a:tab pos="1447800" algn="l"/>
+              </a:tabLst>
+              <a:defRPr sz="2400">
+                <a:solidFill>
+                  <a:schemeClr val="bg1"/>
+                </a:solidFill>
+                <a:latin typeface="Arial" charset="0"/>
+                <a:ea typeface="ＭＳ Ｐゴシック" charset="-128"/>
+              </a:defRPr>
+            </a:lvl5pPr>
+            <a:lvl6pPr marL="2514600" indent="-228600" algn="ctr" defTabSz="449263" eaLnBrk="0" fontAlgn="base" hangingPunct="0">
+              <a:lnSpc>
+                <a:spcPct val="93000"/>
+              </a:lnSpc>
+              <a:spcBef>
+                <a:spcPct val="0"/>
+              </a:spcBef>
+              <a:spcAft>
+                <a:spcPct val="0"/>
+              </a:spcAft>
+              <a:buClr>
+                <a:srgbClr val="000000"/>
+              </a:buClr>
+              <a:buSzPct val="100000"/>
+              <a:buFont typeface="Times New Roman" pitchFamily="16" charset="0"/>
+              <a:tabLst>
+                <a:tab pos="723900" algn="l"/>
+                <a:tab pos="1447800" algn="l"/>
+              </a:tabLst>
+              <a:defRPr sz="2400">
+                <a:solidFill>
+                  <a:schemeClr val="bg1"/>
+                </a:solidFill>
+                <a:latin typeface="Arial" charset="0"/>
+                <a:ea typeface="ＭＳ Ｐゴシック" charset="-128"/>
+              </a:defRPr>
+            </a:lvl6pPr>
+            <a:lvl7pPr marL="2971800" indent="-228600" algn="ctr" defTabSz="449263" eaLnBrk="0" fontAlgn="base" hangingPunct="0">
+              <a:lnSpc>
+                <a:spcPct val="93000"/>
+              </a:lnSpc>
+              <a:spcBef>
+                <a:spcPct val="0"/>
+              </a:spcBef>
+              <a:spcAft>
+                <a:spcPct val="0"/>
+              </a:spcAft>
+              <a:buClr>
+                <a:srgbClr val="000000"/>
+              </a:buClr>
+              <a:buSzPct val="100000"/>
+              <a:buFont typeface="Times New Roman" pitchFamily="16" charset="0"/>
+              <a:tabLst>
+                <a:tab pos="723900" algn="l"/>
+                <a:tab pos="1447800" algn="l"/>
+              </a:tabLst>
+              <a:defRPr sz="2400">
+                <a:solidFill>
+                  <a:schemeClr val="bg1"/>
+                </a:solidFill>
+                <a:latin typeface="Arial" charset="0"/>
+                <a:ea typeface="ＭＳ Ｐゴシック" charset="-128"/>
+              </a:defRPr>
+            </a:lvl7pPr>
+            <a:lvl8pPr marL="3429000" indent="-228600" algn="ctr" defTabSz="449263" eaLnBrk="0" fontAlgn="base" hangingPunct="0">
+              <a:lnSpc>
+                <a:spcPct val="93000"/>
+              </a:lnSpc>
+              <a:spcBef>
+                <a:spcPct val="0"/>
+              </a:spcBef>
+              <a:spcAft>
+                <a:spcPct val="0"/>
+              </a:spcAft>
+              <a:buClr>
+                <a:srgbClr val="000000"/>
+              </a:buClr>
+              <a:buSzPct val="100000"/>
+              <a:buFont typeface="Times New Roman" pitchFamily="16" charset="0"/>
+              <a:tabLst>
+                <a:tab pos="723900" algn="l"/>
+                <a:tab pos="1447800" algn="l"/>
+              </a:tabLst>
+              <a:defRPr sz="2400">
+                <a:solidFill>
+                  <a:schemeClr val="bg1"/>
+                </a:solidFill>
+                <a:latin typeface="Arial" charset="0"/>
+                <a:ea typeface="ＭＳ Ｐゴシック" charset="-128"/>
+              </a:defRPr>
+            </a:lvl8pPr>
+            <a:lvl9pPr marL="3886200" indent="-228600" algn="ctr" defTabSz="449263" eaLnBrk="0" fontAlgn="base" hangingPunct="0">
+              <a:lnSpc>
+                <a:spcPct val="93000"/>
+              </a:lnSpc>
+              <a:spcBef>
+                <a:spcPct val="0"/>
+              </a:spcBef>
+              <a:spcAft>
+                <a:spcPct val="0"/>
+              </a:spcAft>
+              <a:buClr>
+                <a:srgbClr val="000000"/>
+              </a:buClr>
+              <a:buSzPct val="100000"/>
+              <a:buFont typeface="Times New Roman" pitchFamily="16" charset="0"/>
+              <a:tabLst>
+                <a:tab pos="723900" algn="l"/>
+                <a:tab pos="1447800" algn="l"/>
+              </a:tabLst>
+              <a:defRPr sz="2400">
+                <a:solidFill>
+                  <a:schemeClr val="bg1"/>
+                </a:solidFill>
+                <a:latin typeface="Arial" charset="0"/>
+                <a:ea typeface="ＭＳ Ｐゴシック" charset="-128"/>
+              </a:defRPr>
+            </a:lvl9pPr>
+          </a:lstStyle>
+          <a:p>
+            <a:pPr eaLnBrk="1" hangingPunct="1"/>
+            <a:r>
+              <a:rPr lang="en-US" altLang="de-DE" sz="1100">
+                <a:solidFill>
+                  <a:srgbClr val="000000"/>
+                </a:solidFill>
+                <a:latin typeface="Stafford" charset="0"/>
+              </a:rPr>
+              <a:t>November 19, 2007</a:t>
+            </a:r>
+          </a:p>
+        </p:txBody>
+      </p:sp>
+      <p:sp>
+        <p:nvSpPr>
+          <p:cNvPr id="21507" name="Rectangle 7"/>
+          <p:cNvSpPr>
+            <a:spLocks noGrp="1" noChangeArrowheads="1"/>
+          </p:cNvSpPr>
+          <p:nvPr>
+            <p:ph type="ftr" sz="quarter"/>
+          </p:nvPr>
+        </p:nvSpPr>
+        <p:spPr>
+          <a:noFill/>
+        </p:spPr>
+        <p:txBody>
+          <a:bodyPr/>
+          <a:lstStyle>
+            <a:lvl1pPr eaLnBrk="0" hangingPunct="0">
+              <a:tabLst>
+                <a:tab pos="723900" algn="l"/>
+                <a:tab pos="1447800" algn="l"/>
+                <a:tab pos="2171700" algn="l"/>
+                <a:tab pos="2895600" algn="l"/>
+                <a:tab pos="3619500" algn="l"/>
+              </a:tabLst>
+              <a:defRPr sz="2400">
+                <a:solidFill>
+                  <a:schemeClr val="bg1"/>
+                </a:solidFill>
+                <a:latin typeface="Arial" charset="0"/>
+                <a:ea typeface="ＭＳ Ｐゴシック" charset="-128"/>
+              </a:defRPr>
+            </a:lvl1pPr>
+            <a:lvl2pPr eaLnBrk="0" hangingPunct="0">
+              <a:tabLst>
+                <a:tab pos="723900" algn="l"/>
+                <a:tab pos="1447800" algn="l"/>
+                <a:tab pos="2171700" algn="l"/>
+                <a:tab pos="2895600" algn="l"/>
+                <a:tab pos="3619500" algn="l"/>
+              </a:tabLst>
+              <a:defRPr sz="2400">
+                <a:solidFill>
+                  <a:schemeClr val="bg1"/>
+                </a:solidFill>
+                <a:latin typeface="Arial" charset="0"/>
+                <a:ea typeface="ＭＳ Ｐゴシック" charset="-128"/>
+              </a:defRPr>
+            </a:lvl2pPr>
+            <a:lvl3pPr eaLnBrk="0" hangingPunct="0">
+              <a:tabLst>
+                <a:tab pos="723900" algn="l"/>
+                <a:tab pos="1447800" algn="l"/>
+                <a:tab pos="2171700" algn="l"/>
+                <a:tab pos="2895600" algn="l"/>
+                <a:tab pos="3619500" algn="l"/>
+              </a:tabLst>
+              <a:defRPr sz="2400">
+                <a:solidFill>
+                  <a:schemeClr val="bg1"/>
+                </a:solidFill>
+                <a:latin typeface="Arial" charset="0"/>
+                <a:ea typeface="ＭＳ Ｐゴシック" charset="-128"/>
+              </a:defRPr>
+            </a:lvl3pPr>
+            <a:lvl4pPr eaLnBrk="0" hangingPunct="0">
+              <a:tabLst>
+                <a:tab pos="723900" algn="l"/>
+                <a:tab pos="1447800" algn="l"/>
+                <a:tab pos="2171700" algn="l"/>
+                <a:tab pos="2895600" algn="l"/>
+                <a:tab pos="3619500" algn="l"/>
+              </a:tabLst>
+              <a:defRPr sz="2400">
+                <a:solidFill>
+                  <a:schemeClr val="bg1"/>
+                </a:solidFill>
+                <a:latin typeface="Arial" charset="0"/>
+                <a:ea typeface="ＭＳ Ｐゴシック" charset="-128"/>
+              </a:defRPr>
+            </a:lvl4pPr>
+            <a:lvl5pPr eaLnBrk="0" hangingPunct="0">
+              <a:tabLst>
+                <a:tab pos="723900" algn="l"/>
+                <a:tab pos="1447800" algn="l"/>
+                <a:tab pos="2171700" algn="l"/>
+                <a:tab pos="2895600" algn="l"/>
+                <a:tab pos="3619500" algn="l"/>
+              </a:tabLst>
+              <a:defRPr sz="2400">
+                <a:solidFill>
+                  <a:schemeClr val="bg1"/>
+                </a:solidFill>
+                <a:latin typeface="Arial" charset="0"/>
+                <a:ea typeface="ＭＳ Ｐゴシック" charset="-128"/>
+              </a:defRPr>
+            </a:lvl5pPr>
+            <a:lvl6pPr marL="2514600" indent="-228600" algn="ctr" defTabSz="449263" eaLnBrk="0" fontAlgn="base" hangingPunct="0">
+              <a:lnSpc>
+                <a:spcPct val="93000"/>
+              </a:lnSpc>
+              <a:spcBef>
+                <a:spcPct val="0"/>
+              </a:spcBef>
+              <a:spcAft>
+                <a:spcPct val="0"/>
+              </a:spcAft>
+              <a:buClr>
+                <a:srgbClr val="000000"/>
+              </a:buClr>
+              <a:buSzPct val="100000"/>
+              <a:buFont typeface="Times New Roman" pitchFamily="16" charset="0"/>
+              <a:tabLst>
+                <a:tab pos="723900" algn="l"/>
+                <a:tab pos="1447800" algn="l"/>
+                <a:tab pos="2171700" algn="l"/>
+                <a:tab pos="2895600" algn="l"/>
+                <a:tab pos="3619500" algn="l"/>
+              </a:tabLst>
+              <a:defRPr sz="2400">
+                <a:solidFill>
+                  <a:schemeClr val="bg1"/>
+                </a:solidFill>
+                <a:latin typeface="Arial" charset="0"/>
+                <a:ea typeface="ＭＳ Ｐゴシック" charset="-128"/>
+              </a:defRPr>
+            </a:lvl6pPr>
+            <a:lvl7pPr marL="2971800" indent="-228600" algn="ctr" defTabSz="449263" eaLnBrk="0" fontAlgn="base" hangingPunct="0">
+              <a:lnSpc>
+                <a:spcPct val="93000"/>
+              </a:lnSpc>
+              <a:spcBef>
+                <a:spcPct val="0"/>
+              </a:spcBef>
+              <a:spcAft>
+                <a:spcPct val="0"/>
+              </a:spcAft>
+              <a:buClr>
+                <a:srgbClr val="000000"/>
+              </a:buClr>
+              <a:buSzPct val="100000"/>
+              <a:buFont typeface="Times New Roman" pitchFamily="16" charset="0"/>
+              <a:tabLst>
+                <a:tab pos="723900" algn="l"/>
+                <a:tab pos="1447800" algn="l"/>
+                <a:tab pos="2171700" algn="l"/>
+                <a:tab pos="2895600" algn="l"/>
+                <a:tab pos="3619500" algn="l"/>
+              </a:tabLst>
+              <a:defRPr sz="2400">
+                <a:solidFill>
+                  <a:schemeClr val="bg1"/>
+                </a:solidFill>
+                <a:latin typeface="Arial" charset="0"/>
+                <a:ea typeface="ＭＳ Ｐゴシック" charset="-128"/>
+              </a:defRPr>
+            </a:lvl7pPr>
+            <a:lvl8pPr marL="3429000" indent="-228600" algn="ctr" defTabSz="449263" eaLnBrk="0" fontAlgn="base" hangingPunct="0">
+              <a:lnSpc>
+                <a:spcPct val="93000"/>
+              </a:lnSpc>
+              <a:spcBef>
+                <a:spcPct val="0"/>
+              </a:spcBef>
+              <a:spcAft>
+                <a:spcPct val="0"/>
+              </a:spcAft>
+              <a:buClr>
+                <a:srgbClr val="000000"/>
+              </a:buClr>
+              <a:buSzPct val="100000"/>
+              <a:buFont typeface="Times New Roman" pitchFamily="16" charset="0"/>
+              <a:tabLst>
+                <a:tab pos="723900" algn="l"/>
+                <a:tab pos="1447800" algn="l"/>
+                <a:tab pos="2171700" algn="l"/>
+                <a:tab pos="2895600" algn="l"/>
+                <a:tab pos="3619500" algn="l"/>
+              </a:tabLst>
+              <a:defRPr sz="2400">
+                <a:solidFill>
+                  <a:schemeClr val="bg1"/>
+                </a:solidFill>
+                <a:latin typeface="Arial" charset="0"/>
+                <a:ea typeface="ＭＳ Ｐゴシック" charset="-128"/>
+              </a:defRPr>
+            </a:lvl8pPr>
+            <a:lvl9pPr marL="3886200" indent="-228600" algn="ctr" defTabSz="449263" eaLnBrk="0" fontAlgn="base" hangingPunct="0">
+              <a:lnSpc>
+                <a:spcPct val="93000"/>
+              </a:lnSpc>
+              <a:spcBef>
+                <a:spcPct val="0"/>
+              </a:spcBef>
+              <a:spcAft>
+                <a:spcPct val="0"/>
+              </a:spcAft>
+              <a:buClr>
+                <a:srgbClr val="000000"/>
+              </a:buClr>
+              <a:buSzPct val="100000"/>
+              <a:buFont typeface="Times New Roman" pitchFamily="16" charset="0"/>
+              <a:tabLst>
+                <a:tab pos="723900" algn="l"/>
+                <a:tab pos="1447800" algn="l"/>
+                <a:tab pos="2171700" algn="l"/>
+                <a:tab pos="2895600" algn="l"/>
+                <a:tab pos="3619500" algn="l"/>
+              </a:tabLst>
+              <a:defRPr sz="2400">
+                <a:solidFill>
+                  <a:schemeClr val="bg1"/>
+                </a:solidFill>
+                <a:latin typeface="Arial" charset="0"/>
+                <a:ea typeface="ＭＳ Ｐゴシック" charset="-128"/>
+              </a:defRPr>
+            </a:lvl9pPr>
+          </a:lstStyle>
+          <a:p>
+            <a:pPr eaLnBrk="1" hangingPunct="1"/>
+            <a:r>
+              <a:rPr lang="en-US" altLang="de-DE" sz="1100">
+                <a:solidFill>
+                  <a:srgbClr val="000000"/>
+                </a:solidFill>
+                <a:latin typeface="Stafford" charset="0"/>
+              </a:rPr>
+              <a:t>|  </a:t>
+            </a:r>
+          </a:p>
+        </p:txBody>
+      </p:sp>
+      <p:sp>
+        <p:nvSpPr>
+          <p:cNvPr id="21508" name="Rectangle 8"/>
+          <p:cNvSpPr>
+            <a:spLocks noGrp="1" noChangeArrowheads="1"/>
+          </p:cNvSpPr>
+          <p:nvPr>
+            <p:ph type="sldNum" sz="quarter"/>
+          </p:nvPr>
+        </p:nvSpPr>
+        <p:spPr>
+          <a:noFill/>
+        </p:spPr>
+        <p:txBody>
+          <a:bodyPr/>
+          <a:lstStyle>
+            <a:lvl1pPr eaLnBrk="0" hangingPunct="0">
+              <a:tabLst>
+                <a:tab pos="723900" algn="l"/>
+              </a:tabLst>
+              <a:defRPr sz="2400">
+                <a:solidFill>
+                  <a:schemeClr val="bg1"/>
+                </a:solidFill>
+                <a:latin typeface="Arial" charset="0"/>
+                <a:ea typeface="ＭＳ Ｐゴシック" charset="-128"/>
+              </a:defRPr>
+            </a:lvl1pPr>
+            <a:lvl2pPr eaLnBrk="0" hangingPunct="0">
+              <a:tabLst>
+                <a:tab pos="723900" algn="l"/>
+              </a:tabLst>
+              <a:defRPr sz="2400">
+                <a:solidFill>
+                  <a:schemeClr val="bg1"/>
+                </a:solidFill>
+                <a:latin typeface="Arial" charset="0"/>
+                <a:ea typeface="ＭＳ Ｐゴシック" charset="-128"/>
+              </a:defRPr>
+            </a:lvl2pPr>
+            <a:lvl3pPr eaLnBrk="0" hangingPunct="0">
+              <a:tabLst>
+                <a:tab pos="723900" algn="l"/>
+              </a:tabLst>
+              <a:defRPr sz="2400">
+                <a:solidFill>
+                  <a:schemeClr val="bg1"/>
+                </a:solidFill>
+                <a:latin typeface="Arial" charset="0"/>
+                <a:ea typeface="ＭＳ Ｐゴシック" charset="-128"/>
+              </a:defRPr>
+            </a:lvl3pPr>
+            <a:lvl4pPr eaLnBrk="0" hangingPunct="0">
+              <a:tabLst>
+                <a:tab pos="723900" algn="l"/>
+              </a:tabLst>
+              <a:defRPr sz="2400">
+                <a:solidFill>
+                  <a:schemeClr val="bg1"/>
+                </a:solidFill>
+                <a:latin typeface="Arial" charset="0"/>
+                <a:ea typeface="ＭＳ Ｐゴシック" charset="-128"/>
+              </a:defRPr>
+            </a:lvl4pPr>
+            <a:lvl5pPr eaLnBrk="0" hangingPunct="0">
+              <a:tabLst>
+                <a:tab pos="723900" algn="l"/>
+              </a:tabLst>
+              <a:defRPr sz="2400">
+                <a:solidFill>
+                  <a:schemeClr val="bg1"/>
+                </a:solidFill>
+                <a:latin typeface="Arial" charset="0"/>
+                <a:ea typeface="ＭＳ Ｐゴシック" charset="-128"/>
+              </a:defRPr>
+            </a:lvl5pPr>
+            <a:lvl6pPr marL="2514600" indent="-228600" algn="ctr" defTabSz="449263" eaLnBrk="0" fontAlgn="base" hangingPunct="0">
+              <a:lnSpc>
+                <a:spcPct val="93000"/>
+              </a:lnSpc>
+              <a:spcBef>
+                <a:spcPct val="0"/>
+              </a:spcBef>
+              <a:spcAft>
+                <a:spcPct val="0"/>
+              </a:spcAft>
+              <a:buClr>
+                <a:srgbClr val="000000"/>
+              </a:buClr>
+              <a:buSzPct val="100000"/>
+              <a:buFont typeface="Times New Roman" pitchFamily="16" charset="0"/>
+              <a:tabLst>
+                <a:tab pos="723900" algn="l"/>
+              </a:tabLst>
+              <a:defRPr sz="2400">
+                <a:solidFill>
+                  <a:schemeClr val="bg1"/>
+                </a:solidFill>
+                <a:latin typeface="Arial" charset="0"/>
+                <a:ea typeface="ＭＳ Ｐゴシック" charset="-128"/>
+              </a:defRPr>
+            </a:lvl6pPr>
+            <a:lvl7pPr marL="2971800" indent="-228600" algn="ctr" defTabSz="449263" eaLnBrk="0" fontAlgn="base" hangingPunct="0">
+              <a:lnSpc>
+                <a:spcPct val="93000"/>
+              </a:lnSpc>
+              <a:spcBef>
+                <a:spcPct val="0"/>
+              </a:spcBef>
+              <a:spcAft>
+                <a:spcPct val="0"/>
+              </a:spcAft>
+              <a:buClr>
+                <a:srgbClr val="000000"/>
+              </a:buClr>
+              <a:buSzPct val="100000"/>
+              <a:buFont typeface="Times New Roman" pitchFamily="16" charset="0"/>
+              <a:tabLst>
+                <a:tab pos="723900" algn="l"/>
+              </a:tabLst>
+              <a:defRPr sz="2400">
+                <a:solidFill>
+                  <a:schemeClr val="bg1"/>
+                </a:solidFill>
+                <a:latin typeface="Arial" charset="0"/>
+                <a:ea typeface="ＭＳ Ｐゴシック" charset="-128"/>
+              </a:defRPr>
+            </a:lvl7pPr>
+            <a:lvl8pPr marL="3429000" indent="-228600" algn="ctr" defTabSz="449263" eaLnBrk="0" fontAlgn="base" hangingPunct="0">
+              <a:lnSpc>
+                <a:spcPct val="93000"/>
+              </a:lnSpc>
+              <a:spcBef>
+                <a:spcPct val="0"/>
+              </a:spcBef>
+              <a:spcAft>
+                <a:spcPct val="0"/>
+              </a:spcAft>
+              <a:buClr>
+                <a:srgbClr val="000000"/>
+              </a:buClr>
+              <a:buSzPct val="100000"/>
+              <a:buFont typeface="Times New Roman" pitchFamily="16" charset="0"/>
+              <a:tabLst>
+                <a:tab pos="723900" algn="l"/>
+              </a:tabLst>
+              <a:defRPr sz="2400">
+                <a:solidFill>
+                  <a:schemeClr val="bg1"/>
+                </a:solidFill>
+                <a:latin typeface="Arial" charset="0"/>
+                <a:ea typeface="ＭＳ Ｐゴシック" charset="-128"/>
+              </a:defRPr>
+            </a:lvl8pPr>
+            <a:lvl9pPr marL="3886200" indent="-228600" algn="ctr" defTabSz="449263" eaLnBrk="0" fontAlgn="base" hangingPunct="0">
+              <a:lnSpc>
+                <a:spcPct val="93000"/>
+              </a:lnSpc>
+              <a:spcBef>
+                <a:spcPct val="0"/>
+              </a:spcBef>
+              <a:spcAft>
+                <a:spcPct val="0"/>
+              </a:spcAft>
+              <a:buClr>
+                <a:srgbClr val="000000"/>
+              </a:buClr>
+              <a:buSzPct val="100000"/>
+              <a:buFont typeface="Times New Roman" pitchFamily="16" charset="0"/>
+              <a:tabLst>
+                <a:tab pos="723900" algn="l"/>
+              </a:tabLst>
+              <a:defRPr sz="2400">
+                <a:solidFill>
+                  <a:schemeClr val="bg1"/>
+                </a:solidFill>
+                <a:latin typeface="Arial" charset="0"/>
+                <a:ea typeface="ＭＳ Ｐゴシック" charset="-128"/>
+              </a:defRPr>
+            </a:lvl9pPr>
+          </a:lstStyle>
+          <a:p>
+            <a:pPr eaLnBrk="1" hangingPunct="1"/>
+            <a:r>
+              <a:rPr lang="en-US" altLang="de-DE" sz="1100">
+                <a:solidFill>
+                  <a:srgbClr val="000000"/>
+                </a:solidFill>
+                <a:latin typeface="Stafford" charset="0"/>
+              </a:rPr>
+              <a:t>|  </a:t>
+            </a:r>
+            <a:fld id="{58169C6A-BC63-4DF0-A9C3-BCFA44C84BAD}" type="slidenum">
+              <a:rPr lang="en-US" altLang="de-DE" sz="1100">
+                <a:solidFill>
+                  <a:srgbClr val="000000"/>
+                </a:solidFill>
+                <a:latin typeface="Stafford" charset="0"/>
+              </a:rPr>
+              <a:pPr eaLnBrk="1" hangingPunct="1"/>
+              <a:t>11</a:t>
+            </a:fld>
+            <a:endParaRPr lang="en-US" altLang="de-DE" sz="1100">
+              <a:solidFill>
+                <a:srgbClr val="000000"/>
+              </a:solidFill>
+              <a:latin typeface="Stafford" charset="0"/>
+            </a:endParaRPr>
+          </a:p>
+        </p:txBody>
+      </p:sp>
+      <p:sp>
+        <p:nvSpPr>
+          <p:cNvPr id="21509" name="Rectangle 1"/>
+          <p:cNvSpPr txBox="1">
+            <a:spLocks noGrp="1" noRot="1" noChangeAspect="1" noChangeArrowheads="1" noTextEdit="1"/>
+          </p:cNvSpPr>
+          <p:nvPr>
+            <p:ph type="sldImg"/>
+          </p:nvPr>
+        </p:nvSpPr>
+        <p:spPr>
+          <a:xfrm>
+            <a:off x="1152525" y="996950"/>
+            <a:ext cx="4408488" cy="3306763"/>
+          </a:xfrm>
+          <a:solidFill>
+            <a:srgbClr val="FFFFFF"/>
+          </a:solidFill>
+          <a:ln>
+            <a:solidFill>
+              <a:srgbClr val="000000"/>
+            </a:solidFill>
+            <a:miter lim="800000"/>
+            <a:headEnd/>
+            <a:tailEnd/>
+          </a:ln>
+          <a:extLst>
+            <a:ext uri="{AF507438-7753-43E0-B8FC-AC1667EBCBE1}">
+              <a14:hiddenEffects xmlns:a14="http://schemas.microsoft.com/office/drawing/2010/main">
+                <a:effectLst>
+                  <a:outerShdw dist="35921" dir="2700000" algn="ctr" rotWithShape="0">
+                    <a:srgbClr val="808080"/>
+                  </a:outerShdw>
+                </a:effectLst>
+              </a14:hiddenEffects>
+            </a:ext>
+          </a:extLst>
+        </p:spPr>
+      </p:sp>
+      <p:sp>
+        <p:nvSpPr>
+          <p:cNvPr id="21510" name="Rectangle 2"/>
+          <p:cNvSpPr txBox="1">
+            <a:spLocks noGrp="1" noChangeArrowheads="1"/>
+          </p:cNvSpPr>
+          <p:nvPr>
+            <p:ph type="body" idx="1"/>
+          </p:nvPr>
+        </p:nvSpPr>
+        <p:spPr>
+          <a:xfrm>
+            <a:off x="187325" y="4618038"/>
+            <a:ext cx="6354763" cy="4614862"/>
+          </a:xfrm>
+          <a:noFill/>
+          <a:extLst>
+            <a:ext uri="{AF507438-7753-43E0-B8FC-AC1667EBCBE1}">
+              <a14:hiddenEffects xmlns:a14="http://schemas.microsoft.com/office/drawing/2010/main">
+                <a:effectLst>
+                  <a:outerShdw dist="35921" dir="2700000" algn="ctr" rotWithShape="0">
+                    <a:srgbClr val="808080"/>
+                  </a:outerShdw>
+                </a:effectLst>
+              </a14:hiddenEffects>
+            </a:ext>
+          </a:extLst>
+        </p:spPr>
+        <p:txBody>
+          <a:bodyPr wrap="none" anchor="ctr"/>
+          <a:lstStyle/>
+          <a:p>
+            <a:endParaRPr lang="de-DE" altLang="de-DE" smtClean="0"/>
+          </a:p>
+        </p:txBody>
+      </p:sp>
+    </p:spTree>
+    <p:extLst>
+      <p:ext uri="{BB962C8B-B14F-4D97-AF65-F5344CB8AC3E}">
+        <p14:creationId xmlns:p14="http://schemas.microsoft.com/office/powerpoint/2010/main" val="4261532882"/>
+      </p:ext>
+    </p:extLst>
+  </p:cSld>
+  <p:clrMapOvr>
+    <a:masterClrMapping/>
+  </p:clrMapOvr>
+</p:notes>
+</file>
+
 <file path=ppt/notesSlides/notesSlide2.xml><?xml version="1.0" encoding="utf-8"?>
 <p:notes xmlns:a="http://schemas.openxmlformats.org/drawingml/2006/main" xmlns:r="http://schemas.openxmlformats.org/officeDocument/2006/relationships" xmlns:p="http://schemas.openxmlformats.org/presentationml/2006/main">
   <p:cSld>
@@ -7567,7 +9087,7 @@
       </p:grpSpPr>
       <p:sp>
         <p:nvSpPr>
-          <p:cNvPr id="21506" name="Rectangle 4"/>
+          <p:cNvPr id="20482" name="Rectangle 4"/>
           <p:cNvSpPr>
             <a:spLocks noGrp="1" noChangeArrowheads="1"/>
           </p:cNvSpPr>
@@ -7771,7 +9291,7 @@
       </p:sp>
       <p:sp>
         <p:nvSpPr>
-          <p:cNvPr id="21507" name="Rectangle 7"/>
+          <p:cNvPr id="20483" name="Rectangle 7"/>
           <p:cNvSpPr>
             <a:spLocks noGrp="1" noChangeArrowheads="1"/>
           </p:cNvSpPr>
@@ -8002,7 +9522,7 @@
       </p:sp>
       <p:sp>
         <p:nvSpPr>
-          <p:cNvPr id="21508" name="Rectangle 8"/>
+          <p:cNvPr id="20484" name="Rectangle 8"/>
           <p:cNvSpPr>
             <a:spLocks noGrp="1" noChangeArrowheads="1"/>
           </p:cNvSpPr>
@@ -8192,7 +9712,7 @@
               </a:rPr>
               <a:t>|  </a:t>
             </a:r>
-            <a:fld id="{58169C6A-BC63-4DF0-A9C3-BCFA44C84BAD}" type="slidenum">
+            <a:fld id="{A62A0A1C-AB20-40E2-807C-FC984F3F4C45}" type="slidenum">
               <a:rPr lang="en-US" altLang="de-DE" sz="1100">
                 <a:solidFill>
                   <a:srgbClr val="000000"/>
@@ -8213,7 +9733,7 @@
       </p:sp>
       <p:sp>
         <p:nvSpPr>
-          <p:cNvPr id="21509" name="Rectangle 1"/>
+          <p:cNvPr id="20485" name="Rectangle 1"/>
           <p:cNvSpPr txBox="1">
             <a:spLocks noGrp="1" noRot="1" noChangeAspect="1" noChangeArrowheads="1" noTextEdit="1"/>
           </p:cNvSpPr>
@@ -8252,7 +9772,7 @@
       </p:sp>
       <p:sp>
         <p:nvSpPr>
-          <p:cNvPr id="21510" name="Rectangle 2"/>
+          <p:cNvPr id="20486" name="Rectangle 2"/>
           <p:cNvSpPr txBox="1">
             <a:spLocks noGrp="1" noChangeArrowheads="1"/>
           </p:cNvSpPr>
@@ -8289,7 +9809,7 @@
     </p:spTree>
     <p:extLst>
       <p:ext uri="{BB962C8B-B14F-4D97-AF65-F5344CB8AC3E}">
-        <p14:creationId xmlns:p14="http://schemas.microsoft.com/office/powerpoint/2010/main" val="1228250305"/>
+        <p14:creationId xmlns:p14="http://schemas.microsoft.com/office/powerpoint/2010/main" val="2821137744"/>
       </p:ext>
     </p:extLst>
   </p:cSld>
@@ -12734,7 +14254,7 @@
           <a:graphicData uri="http://schemas.openxmlformats.org/presentationml/2006/ole">
             <mc:AlternateContent xmlns:mc="http://schemas.openxmlformats.org/markup-compatibility/2006">
               <mc:Choice xmlns:v="urn:schemas-microsoft-com:vml" Requires="v">
-                <p:oleObj spid="_x0000_s1054" r:id="rId15" imgW="1038370" imgH="980952" progId="">
+                <p:oleObj spid="_x0000_s1061" r:id="rId15" imgW="1038370" imgH="980952" progId="">
                   <p:embed/>
                 </p:oleObj>
               </mc:Choice>
@@ -17627,6 +19147,1112 @@
 </p:sld>
 </file>
 
+<file path=ppt/slides/slide10.xml><?xml version="1.0" encoding="utf-8"?>
+<p:sld xmlns:a="http://schemas.openxmlformats.org/drawingml/2006/main" xmlns:r="http://schemas.openxmlformats.org/officeDocument/2006/relationships" xmlns:p="http://schemas.openxmlformats.org/presentationml/2006/main">
+  <p:cSld>
+    <p:bg>
+      <p:bgPr>
+        <a:solidFill>
+          <a:srgbClr val="FFFFFF"/>
+        </a:solidFill>
+        <a:effectLst/>
+      </p:bgPr>
+    </p:bg>
+    <p:spTree>
+      <p:nvGrpSpPr>
+        <p:cNvPr id="1" name=""/>
+        <p:cNvGrpSpPr/>
+        <p:nvPr/>
+      </p:nvGrpSpPr>
+      <p:grpSpPr>
+        <a:xfrm>
+          <a:off x="0" y="0"/>
+          <a:ext cx="0" cy="0"/>
+          <a:chOff x="0" y="0"/>
+          <a:chExt cx="0" cy="0"/>
+        </a:xfrm>
+      </p:grpSpPr>
+      <p:sp>
+        <p:nvSpPr>
+          <p:cNvPr id="11266" name="Rectangle 1"/>
+          <p:cNvSpPr>
+            <a:spLocks noGrp="1" noChangeArrowheads="1"/>
+          </p:cNvSpPr>
+          <p:nvPr>
+            <p:ph type="title" idx="4294967295"/>
+          </p:nvPr>
+        </p:nvSpPr>
+        <p:spPr>
+          <a:xfrm>
+            <a:off x="358775" y="488950"/>
+            <a:ext cx="6877050" cy="838200"/>
+          </a:xfrm>
+        </p:spPr>
+        <p:txBody>
+          <a:bodyPr/>
+          <a:lstStyle/>
+          <a:p>
+            <a:pPr>
+              <a:tabLst>
+                <a:tab pos="0" algn="l"/>
+                <a:tab pos="914400" algn="l"/>
+                <a:tab pos="1828800" algn="l"/>
+                <a:tab pos="2743200" algn="l"/>
+                <a:tab pos="3657600" algn="l"/>
+                <a:tab pos="4572000" algn="l"/>
+                <a:tab pos="5486400" algn="l"/>
+                <a:tab pos="6400800" algn="l"/>
+                <a:tab pos="7315200" algn="l"/>
+                <a:tab pos="8229600" algn="l"/>
+                <a:tab pos="9144000" algn="l"/>
+                <a:tab pos="10058400" algn="l"/>
+              </a:tabLst>
+            </a:pPr>
+            <a:r>
+              <a:rPr lang="de-DE" altLang="de-DE" smtClean="0"/>
+              <a:t>Analog/Digital-Wandler</a:t>
+            </a:r>
+          </a:p>
+        </p:txBody>
+      </p:sp>
+      <p:sp>
+        <p:nvSpPr>
+          <p:cNvPr id="11267" name="Rectangle 2"/>
+          <p:cNvSpPr>
+            <a:spLocks noGrp="1" noChangeArrowheads="1"/>
+          </p:cNvSpPr>
+          <p:nvPr>
+            <p:ph type="body" idx="4294967295"/>
+          </p:nvPr>
+        </p:nvSpPr>
+        <p:spPr>
+          <a:xfrm>
+            <a:off x="250825" y="1484313"/>
+            <a:ext cx="8640763" cy="4968875"/>
+          </a:xfrm>
+        </p:spPr>
+        <p:txBody>
+          <a:bodyPr/>
+          <a:lstStyle/>
+          <a:p>
+            <a:pPr marL="347663" lvl="1" indent="-168275">
+              <a:buFont typeface="Wingdings" charset="2"/>
+              <a:buChar char=""/>
+              <a:tabLst>
+                <a:tab pos="911225" algn="l"/>
+                <a:tab pos="1825625" algn="l"/>
+                <a:tab pos="2740025" algn="l"/>
+                <a:tab pos="3654425" algn="l"/>
+                <a:tab pos="4568825" algn="l"/>
+                <a:tab pos="5483225" algn="l"/>
+                <a:tab pos="6397625" algn="l"/>
+                <a:tab pos="7312025" algn="l"/>
+                <a:tab pos="8226425" algn="l"/>
+                <a:tab pos="9140825" algn="l"/>
+                <a:tab pos="10055225" algn="l"/>
+              </a:tabLst>
+            </a:pPr>
+            <a:r>
+              <a:rPr lang="de-DE" altLang="de-DE" smtClean="0"/>
+              <a:t>8 Bit oder 10 Bit Genauigkeit (wir verwenden 8 Bit)</a:t>
+            </a:r>
+          </a:p>
+          <a:p>
+            <a:pPr marL="347663" lvl="1" indent="-168275">
+              <a:buFont typeface="Wingdings" charset="2"/>
+              <a:buChar char=""/>
+              <a:tabLst>
+                <a:tab pos="911225" algn="l"/>
+                <a:tab pos="1825625" algn="l"/>
+                <a:tab pos="2740025" algn="l"/>
+                <a:tab pos="3654425" algn="l"/>
+                <a:tab pos="4568825" algn="l"/>
+                <a:tab pos="5483225" algn="l"/>
+                <a:tab pos="6397625" algn="l"/>
+                <a:tab pos="7312025" algn="l"/>
+                <a:tab pos="8226425" algn="l"/>
+                <a:tab pos="9140825" algn="l"/>
+                <a:tab pos="10055225" algn="l"/>
+              </a:tabLst>
+            </a:pPr>
+            <a:r>
+              <a:rPr lang="de-DE" altLang="de-DE" smtClean="0"/>
+              <a:t>Verschiedene Wandlungsmodi (z.B. mehrere Eingänge sequentiell wandeln)</a:t>
+            </a:r>
+          </a:p>
+          <a:p>
+            <a:pPr marL="536575" lvl="2" indent="-185738">
+              <a:buFont typeface="Wingdings" charset="2"/>
+              <a:buChar char=""/>
+              <a:tabLst>
+                <a:tab pos="911225" algn="l"/>
+                <a:tab pos="1825625" algn="l"/>
+                <a:tab pos="2740025" algn="l"/>
+                <a:tab pos="3654425" algn="l"/>
+                <a:tab pos="4568825" algn="l"/>
+                <a:tab pos="5483225" algn="l"/>
+                <a:tab pos="6397625" algn="l"/>
+                <a:tab pos="7312025" algn="l"/>
+                <a:tab pos="8226425" algn="l"/>
+                <a:tab pos="9140825" algn="l"/>
+                <a:tab pos="10055225" algn="l"/>
+              </a:tabLst>
+            </a:pPr>
+            <a:r>
+              <a:rPr lang="de-DE" altLang="de-DE" smtClean="0"/>
+              <a:t>Wir verwenden </a:t>
+            </a:r>
+            <a:r>
+              <a:rPr lang="de-DE" altLang="de-DE" b="1" smtClean="0"/>
+              <a:t>Stop Mode</a:t>
+            </a:r>
+            <a:r>
+              <a:rPr lang="de-DE" altLang="de-DE" smtClean="0"/>
+              <a:t>: ein Kanal wird einmal pro Startsignal gewandelt</a:t>
+            </a:r>
+          </a:p>
+          <a:p>
+            <a:pPr marL="536575" lvl="2" indent="-185738">
+              <a:buFont typeface="Wingdings" charset="2"/>
+              <a:buChar char=""/>
+              <a:tabLst>
+                <a:tab pos="911225" algn="l"/>
+                <a:tab pos="1825625" algn="l"/>
+                <a:tab pos="2740025" algn="l"/>
+                <a:tab pos="3654425" algn="l"/>
+                <a:tab pos="4568825" algn="l"/>
+                <a:tab pos="5483225" algn="l"/>
+                <a:tab pos="6397625" algn="l"/>
+                <a:tab pos="7312025" algn="l"/>
+                <a:tab pos="8226425" algn="l"/>
+                <a:tab pos="9140825" algn="l"/>
+                <a:tab pos="10055225" algn="l"/>
+              </a:tabLst>
+            </a:pPr>
+            <a:r>
+              <a:rPr lang="de-DE" altLang="de-DE" smtClean="0"/>
+              <a:t>Start- und Endkanal erhalten bei jeder Wandlung einen identischen Wert</a:t>
+            </a:r>
+          </a:p>
+        </p:txBody>
+      </p:sp>
+      <p:sp>
+        <p:nvSpPr>
+          <p:cNvPr id="11268" name="Text Box 3"/>
+          <p:cNvSpPr txBox="1">
+            <a:spLocks noChangeArrowheads="1"/>
+          </p:cNvSpPr>
+          <p:nvPr/>
+        </p:nvSpPr>
+        <p:spPr bwMode="auto">
+          <a:xfrm>
+            <a:off x="539552" y="2924944"/>
+            <a:ext cx="7776864" cy="3456384"/>
+          </a:xfrm>
+          <a:prstGeom prst="rect">
+            <a:avLst/>
+          </a:prstGeom>
+          <a:solidFill>
+            <a:srgbClr val="C0C0C0"/>
+          </a:solidFill>
+          <a:ln>
+            <a:noFill/>
+          </a:ln>
+          <a:effectLst/>
+          <a:extLst>
+            <a:ext uri="{91240B29-F687-4F45-9708-019B960494DF}">
+              <a14:hiddenLine xmlns:a14="http://schemas.microsoft.com/office/drawing/2010/main" w="9525">
+                <a:solidFill>
+                  <a:srgbClr val="000000"/>
+                </a:solidFill>
+                <a:round/>
+                <a:headEnd/>
+                <a:tailEnd/>
+              </a14:hiddenLine>
+            </a:ext>
+            <a:ext uri="{AF507438-7753-43E0-B8FC-AC1667EBCBE1}">
+              <a14:hiddenEffects xmlns:a14="http://schemas.microsoft.com/office/drawing/2010/main">
+                <a:effectLst>
+                  <a:outerShdw dist="35921" dir="2700000" algn="ctr" rotWithShape="0">
+                    <a:srgbClr val="808080"/>
+                  </a:outerShdw>
+                </a:effectLst>
+              </a14:hiddenEffects>
+            </a:ext>
+          </a:extLst>
+        </p:spPr>
+        <p:txBody>
+          <a:bodyPr lIns="90000" tIns="45000" rIns="90000" bIns="45000"/>
+          <a:lstStyle>
+            <a:lvl1pPr eaLnBrk="0" hangingPunct="0">
+              <a:tabLst>
+                <a:tab pos="0" algn="l"/>
+                <a:tab pos="447675" algn="l"/>
+                <a:tab pos="896938" algn="l"/>
+                <a:tab pos="1346200" algn="l"/>
+                <a:tab pos="1795463" algn="l"/>
+                <a:tab pos="2244725" algn="l"/>
+                <a:tab pos="2693988" algn="l"/>
+                <a:tab pos="3143250" algn="l"/>
+                <a:tab pos="3592513" algn="l"/>
+                <a:tab pos="4041775" algn="l"/>
+                <a:tab pos="4491038" algn="l"/>
+                <a:tab pos="4940300" algn="l"/>
+                <a:tab pos="5389563" algn="l"/>
+                <a:tab pos="5838825" algn="l"/>
+                <a:tab pos="6288088" algn="l"/>
+                <a:tab pos="6737350" algn="l"/>
+                <a:tab pos="7186613" algn="l"/>
+                <a:tab pos="7635875" algn="l"/>
+                <a:tab pos="8085138" algn="l"/>
+                <a:tab pos="8534400" algn="l"/>
+                <a:tab pos="8983663" algn="l"/>
+              </a:tabLst>
+              <a:defRPr sz="2400">
+                <a:solidFill>
+                  <a:schemeClr val="bg1"/>
+                </a:solidFill>
+                <a:latin typeface="Arial" charset="0"/>
+                <a:ea typeface="ＭＳ Ｐゴシック" charset="-128"/>
+              </a:defRPr>
+            </a:lvl1pPr>
+            <a:lvl2pPr eaLnBrk="0" hangingPunct="0">
+              <a:tabLst>
+                <a:tab pos="0" algn="l"/>
+                <a:tab pos="447675" algn="l"/>
+                <a:tab pos="896938" algn="l"/>
+                <a:tab pos="1346200" algn="l"/>
+                <a:tab pos="1795463" algn="l"/>
+                <a:tab pos="2244725" algn="l"/>
+                <a:tab pos="2693988" algn="l"/>
+                <a:tab pos="3143250" algn="l"/>
+                <a:tab pos="3592513" algn="l"/>
+                <a:tab pos="4041775" algn="l"/>
+                <a:tab pos="4491038" algn="l"/>
+                <a:tab pos="4940300" algn="l"/>
+                <a:tab pos="5389563" algn="l"/>
+                <a:tab pos="5838825" algn="l"/>
+                <a:tab pos="6288088" algn="l"/>
+                <a:tab pos="6737350" algn="l"/>
+                <a:tab pos="7186613" algn="l"/>
+                <a:tab pos="7635875" algn="l"/>
+                <a:tab pos="8085138" algn="l"/>
+                <a:tab pos="8534400" algn="l"/>
+                <a:tab pos="8983663" algn="l"/>
+              </a:tabLst>
+              <a:defRPr sz="2400">
+                <a:solidFill>
+                  <a:schemeClr val="bg1"/>
+                </a:solidFill>
+                <a:latin typeface="Arial" charset="0"/>
+                <a:ea typeface="ＭＳ Ｐゴシック" charset="-128"/>
+              </a:defRPr>
+            </a:lvl2pPr>
+            <a:lvl3pPr eaLnBrk="0" hangingPunct="0">
+              <a:tabLst>
+                <a:tab pos="0" algn="l"/>
+                <a:tab pos="447675" algn="l"/>
+                <a:tab pos="896938" algn="l"/>
+                <a:tab pos="1346200" algn="l"/>
+                <a:tab pos="1795463" algn="l"/>
+                <a:tab pos="2244725" algn="l"/>
+                <a:tab pos="2693988" algn="l"/>
+                <a:tab pos="3143250" algn="l"/>
+                <a:tab pos="3592513" algn="l"/>
+                <a:tab pos="4041775" algn="l"/>
+                <a:tab pos="4491038" algn="l"/>
+                <a:tab pos="4940300" algn="l"/>
+                <a:tab pos="5389563" algn="l"/>
+                <a:tab pos="5838825" algn="l"/>
+                <a:tab pos="6288088" algn="l"/>
+                <a:tab pos="6737350" algn="l"/>
+                <a:tab pos="7186613" algn="l"/>
+                <a:tab pos="7635875" algn="l"/>
+                <a:tab pos="8085138" algn="l"/>
+                <a:tab pos="8534400" algn="l"/>
+                <a:tab pos="8983663" algn="l"/>
+              </a:tabLst>
+              <a:defRPr sz="2400">
+                <a:solidFill>
+                  <a:schemeClr val="bg1"/>
+                </a:solidFill>
+                <a:latin typeface="Arial" charset="0"/>
+                <a:ea typeface="ＭＳ Ｐゴシック" charset="-128"/>
+              </a:defRPr>
+            </a:lvl3pPr>
+            <a:lvl4pPr eaLnBrk="0" hangingPunct="0">
+              <a:tabLst>
+                <a:tab pos="0" algn="l"/>
+                <a:tab pos="447675" algn="l"/>
+                <a:tab pos="896938" algn="l"/>
+                <a:tab pos="1346200" algn="l"/>
+                <a:tab pos="1795463" algn="l"/>
+                <a:tab pos="2244725" algn="l"/>
+                <a:tab pos="2693988" algn="l"/>
+                <a:tab pos="3143250" algn="l"/>
+                <a:tab pos="3592513" algn="l"/>
+                <a:tab pos="4041775" algn="l"/>
+                <a:tab pos="4491038" algn="l"/>
+                <a:tab pos="4940300" algn="l"/>
+                <a:tab pos="5389563" algn="l"/>
+                <a:tab pos="5838825" algn="l"/>
+                <a:tab pos="6288088" algn="l"/>
+                <a:tab pos="6737350" algn="l"/>
+                <a:tab pos="7186613" algn="l"/>
+                <a:tab pos="7635875" algn="l"/>
+                <a:tab pos="8085138" algn="l"/>
+                <a:tab pos="8534400" algn="l"/>
+                <a:tab pos="8983663" algn="l"/>
+              </a:tabLst>
+              <a:defRPr sz="2400">
+                <a:solidFill>
+                  <a:schemeClr val="bg1"/>
+                </a:solidFill>
+                <a:latin typeface="Arial" charset="0"/>
+                <a:ea typeface="ＭＳ Ｐゴシック" charset="-128"/>
+              </a:defRPr>
+            </a:lvl4pPr>
+            <a:lvl5pPr eaLnBrk="0" hangingPunct="0">
+              <a:tabLst>
+                <a:tab pos="0" algn="l"/>
+                <a:tab pos="447675" algn="l"/>
+                <a:tab pos="896938" algn="l"/>
+                <a:tab pos="1346200" algn="l"/>
+                <a:tab pos="1795463" algn="l"/>
+                <a:tab pos="2244725" algn="l"/>
+                <a:tab pos="2693988" algn="l"/>
+                <a:tab pos="3143250" algn="l"/>
+                <a:tab pos="3592513" algn="l"/>
+                <a:tab pos="4041775" algn="l"/>
+                <a:tab pos="4491038" algn="l"/>
+                <a:tab pos="4940300" algn="l"/>
+                <a:tab pos="5389563" algn="l"/>
+                <a:tab pos="5838825" algn="l"/>
+                <a:tab pos="6288088" algn="l"/>
+                <a:tab pos="6737350" algn="l"/>
+                <a:tab pos="7186613" algn="l"/>
+                <a:tab pos="7635875" algn="l"/>
+                <a:tab pos="8085138" algn="l"/>
+                <a:tab pos="8534400" algn="l"/>
+                <a:tab pos="8983663" algn="l"/>
+              </a:tabLst>
+              <a:defRPr sz="2400">
+                <a:solidFill>
+                  <a:schemeClr val="bg1"/>
+                </a:solidFill>
+                <a:latin typeface="Arial" charset="0"/>
+                <a:ea typeface="ＭＳ Ｐゴシック" charset="-128"/>
+              </a:defRPr>
+            </a:lvl5pPr>
+            <a:lvl6pPr marL="2514600" indent="-228600" algn="ctr" defTabSz="449263" eaLnBrk="0" fontAlgn="base" hangingPunct="0">
+              <a:lnSpc>
+                <a:spcPct val="93000"/>
+              </a:lnSpc>
+              <a:spcBef>
+                <a:spcPct val="0"/>
+              </a:spcBef>
+              <a:spcAft>
+                <a:spcPct val="0"/>
+              </a:spcAft>
+              <a:buClr>
+                <a:srgbClr val="000000"/>
+              </a:buClr>
+              <a:buSzPct val="100000"/>
+              <a:buFont typeface="Times New Roman" pitchFamily="16" charset="0"/>
+              <a:tabLst>
+                <a:tab pos="0" algn="l"/>
+                <a:tab pos="447675" algn="l"/>
+                <a:tab pos="896938" algn="l"/>
+                <a:tab pos="1346200" algn="l"/>
+                <a:tab pos="1795463" algn="l"/>
+                <a:tab pos="2244725" algn="l"/>
+                <a:tab pos="2693988" algn="l"/>
+                <a:tab pos="3143250" algn="l"/>
+                <a:tab pos="3592513" algn="l"/>
+                <a:tab pos="4041775" algn="l"/>
+                <a:tab pos="4491038" algn="l"/>
+                <a:tab pos="4940300" algn="l"/>
+                <a:tab pos="5389563" algn="l"/>
+                <a:tab pos="5838825" algn="l"/>
+                <a:tab pos="6288088" algn="l"/>
+                <a:tab pos="6737350" algn="l"/>
+                <a:tab pos="7186613" algn="l"/>
+                <a:tab pos="7635875" algn="l"/>
+                <a:tab pos="8085138" algn="l"/>
+                <a:tab pos="8534400" algn="l"/>
+                <a:tab pos="8983663" algn="l"/>
+              </a:tabLst>
+              <a:defRPr sz="2400">
+                <a:solidFill>
+                  <a:schemeClr val="bg1"/>
+                </a:solidFill>
+                <a:latin typeface="Arial" charset="0"/>
+                <a:ea typeface="ＭＳ Ｐゴシック" charset="-128"/>
+              </a:defRPr>
+            </a:lvl6pPr>
+            <a:lvl7pPr marL="2971800" indent="-228600" algn="ctr" defTabSz="449263" eaLnBrk="0" fontAlgn="base" hangingPunct="0">
+              <a:lnSpc>
+                <a:spcPct val="93000"/>
+              </a:lnSpc>
+              <a:spcBef>
+                <a:spcPct val="0"/>
+              </a:spcBef>
+              <a:spcAft>
+                <a:spcPct val="0"/>
+              </a:spcAft>
+              <a:buClr>
+                <a:srgbClr val="000000"/>
+              </a:buClr>
+              <a:buSzPct val="100000"/>
+              <a:buFont typeface="Times New Roman" pitchFamily="16" charset="0"/>
+              <a:tabLst>
+                <a:tab pos="0" algn="l"/>
+                <a:tab pos="447675" algn="l"/>
+                <a:tab pos="896938" algn="l"/>
+                <a:tab pos="1346200" algn="l"/>
+                <a:tab pos="1795463" algn="l"/>
+                <a:tab pos="2244725" algn="l"/>
+                <a:tab pos="2693988" algn="l"/>
+                <a:tab pos="3143250" algn="l"/>
+                <a:tab pos="3592513" algn="l"/>
+                <a:tab pos="4041775" algn="l"/>
+                <a:tab pos="4491038" algn="l"/>
+                <a:tab pos="4940300" algn="l"/>
+                <a:tab pos="5389563" algn="l"/>
+                <a:tab pos="5838825" algn="l"/>
+                <a:tab pos="6288088" algn="l"/>
+                <a:tab pos="6737350" algn="l"/>
+                <a:tab pos="7186613" algn="l"/>
+                <a:tab pos="7635875" algn="l"/>
+                <a:tab pos="8085138" algn="l"/>
+                <a:tab pos="8534400" algn="l"/>
+                <a:tab pos="8983663" algn="l"/>
+              </a:tabLst>
+              <a:defRPr sz="2400">
+                <a:solidFill>
+                  <a:schemeClr val="bg1"/>
+                </a:solidFill>
+                <a:latin typeface="Arial" charset="0"/>
+                <a:ea typeface="ＭＳ Ｐゴシック" charset="-128"/>
+              </a:defRPr>
+            </a:lvl7pPr>
+            <a:lvl8pPr marL="3429000" indent="-228600" algn="ctr" defTabSz="449263" eaLnBrk="0" fontAlgn="base" hangingPunct="0">
+              <a:lnSpc>
+                <a:spcPct val="93000"/>
+              </a:lnSpc>
+              <a:spcBef>
+                <a:spcPct val="0"/>
+              </a:spcBef>
+              <a:spcAft>
+                <a:spcPct val="0"/>
+              </a:spcAft>
+              <a:buClr>
+                <a:srgbClr val="000000"/>
+              </a:buClr>
+              <a:buSzPct val="100000"/>
+              <a:buFont typeface="Times New Roman" pitchFamily="16" charset="0"/>
+              <a:tabLst>
+                <a:tab pos="0" algn="l"/>
+                <a:tab pos="447675" algn="l"/>
+                <a:tab pos="896938" algn="l"/>
+                <a:tab pos="1346200" algn="l"/>
+                <a:tab pos="1795463" algn="l"/>
+                <a:tab pos="2244725" algn="l"/>
+                <a:tab pos="2693988" algn="l"/>
+                <a:tab pos="3143250" algn="l"/>
+                <a:tab pos="3592513" algn="l"/>
+                <a:tab pos="4041775" algn="l"/>
+                <a:tab pos="4491038" algn="l"/>
+                <a:tab pos="4940300" algn="l"/>
+                <a:tab pos="5389563" algn="l"/>
+                <a:tab pos="5838825" algn="l"/>
+                <a:tab pos="6288088" algn="l"/>
+                <a:tab pos="6737350" algn="l"/>
+                <a:tab pos="7186613" algn="l"/>
+                <a:tab pos="7635875" algn="l"/>
+                <a:tab pos="8085138" algn="l"/>
+                <a:tab pos="8534400" algn="l"/>
+                <a:tab pos="8983663" algn="l"/>
+              </a:tabLst>
+              <a:defRPr sz="2400">
+                <a:solidFill>
+                  <a:schemeClr val="bg1"/>
+                </a:solidFill>
+                <a:latin typeface="Arial" charset="0"/>
+                <a:ea typeface="ＭＳ Ｐゴシック" charset="-128"/>
+              </a:defRPr>
+            </a:lvl8pPr>
+            <a:lvl9pPr marL="3886200" indent="-228600" algn="ctr" defTabSz="449263" eaLnBrk="0" fontAlgn="base" hangingPunct="0">
+              <a:lnSpc>
+                <a:spcPct val="93000"/>
+              </a:lnSpc>
+              <a:spcBef>
+                <a:spcPct val="0"/>
+              </a:spcBef>
+              <a:spcAft>
+                <a:spcPct val="0"/>
+              </a:spcAft>
+              <a:buClr>
+                <a:srgbClr val="000000"/>
+              </a:buClr>
+              <a:buSzPct val="100000"/>
+              <a:buFont typeface="Times New Roman" pitchFamily="16" charset="0"/>
+              <a:tabLst>
+                <a:tab pos="0" algn="l"/>
+                <a:tab pos="447675" algn="l"/>
+                <a:tab pos="896938" algn="l"/>
+                <a:tab pos="1346200" algn="l"/>
+                <a:tab pos="1795463" algn="l"/>
+                <a:tab pos="2244725" algn="l"/>
+                <a:tab pos="2693988" algn="l"/>
+                <a:tab pos="3143250" algn="l"/>
+                <a:tab pos="3592513" algn="l"/>
+                <a:tab pos="4041775" algn="l"/>
+                <a:tab pos="4491038" algn="l"/>
+                <a:tab pos="4940300" algn="l"/>
+                <a:tab pos="5389563" algn="l"/>
+                <a:tab pos="5838825" algn="l"/>
+                <a:tab pos="6288088" algn="l"/>
+                <a:tab pos="6737350" algn="l"/>
+                <a:tab pos="7186613" algn="l"/>
+                <a:tab pos="7635875" algn="l"/>
+                <a:tab pos="8085138" algn="l"/>
+                <a:tab pos="8534400" algn="l"/>
+                <a:tab pos="8983663" algn="l"/>
+              </a:tabLst>
+              <a:defRPr sz="2400">
+                <a:solidFill>
+                  <a:schemeClr val="bg1"/>
+                </a:solidFill>
+                <a:latin typeface="Arial" charset="0"/>
+                <a:ea typeface="ＭＳ Ｐゴシック" charset="-128"/>
+              </a:defRPr>
+            </a:lvl9pPr>
+          </a:lstStyle>
+          <a:p>
+            <a:pPr algn="l" eaLnBrk="1" hangingPunct="1"/>
+            <a:r>
+              <a:rPr lang="de-DE" altLang="de-DE" sz="1600" b="1" dirty="0" err="1" smtClean="0">
+                <a:solidFill>
+                  <a:srgbClr val="000000"/>
+                </a:solidFill>
+                <a:latin typeface="Courier New" pitchFamily="49" charset="0"/>
+              </a:rPr>
+              <a:t>unsigned</a:t>
+            </a:r>
+            <a:r>
+              <a:rPr lang="de-DE" altLang="de-DE" sz="1600" b="1" dirty="0" smtClean="0">
+                <a:solidFill>
+                  <a:srgbClr val="000000"/>
+                </a:solidFill>
+                <a:latin typeface="Courier New" pitchFamily="49" charset="0"/>
+              </a:rPr>
+              <a:t> </a:t>
+            </a:r>
+            <a:r>
+              <a:rPr lang="de-DE" altLang="de-DE" sz="1600" b="1" dirty="0" err="1">
+                <a:solidFill>
+                  <a:srgbClr val="000000"/>
+                </a:solidFill>
+                <a:latin typeface="Courier New" pitchFamily="49" charset="0"/>
+              </a:rPr>
+              <a:t>char</a:t>
+            </a:r>
+            <a:r>
+              <a:rPr lang="de-DE" altLang="de-DE" sz="1600" b="1" dirty="0">
+                <a:solidFill>
+                  <a:srgbClr val="000000"/>
+                </a:solidFill>
+                <a:latin typeface="Courier New" pitchFamily="49" charset="0"/>
+              </a:rPr>
+              <a:t> </a:t>
+            </a:r>
+            <a:r>
+              <a:rPr lang="de-DE" altLang="de-DE" sz="1600" b="1" dirty="0" err="1">
+                <a:solidFill>
+                  <a:srgbClr val="000000"/>
+                </a:solidFill>
+                <a:latin typeface="Courier New" pitchFamily="49" charset="0"/>
+              </a:rPr>
+              <a:t>result</a:t>
+            </a:r>
+            <a:r>
+              <a:rPr lang="de-DE" altLang="de-DE" sz="1600" b="1" dirty="0">
+                <a:solidFill>
+                  <a:srgbClr val="000000"/>
+                </a:solidFill>
+                <a:latin typeface="Courier New" pitchFamily="49" charset="0"/>
+              </a:rPr>
+              <a:t>;</a:t>
+            </a:r>
+          </a:p>
+          <a:p>
+            <a:pPr algn="l" eaLnBrk="1" hangingPunct="1"/>
+            <a:r>
+              <a:rPr lang="de-DE" altLang="de-DE" sz="1600" b="1" dirty="0" smtClean="0">
+                <a:solidFill>
+                  <a:srgbClr val="000000"/>
+                </a:solidFill>
+                <a:latin typeface="Courier New" pitchFamily="49" charset="0"/>
+              </a:rPr>
+              <a:t/>
+            </a:r>
+            <a:br>
+              <a:rPr lang="de-DE" altLang="de-DE" sz="1600" b="1" dirty="0" smtClean="0">
+                <a:solidFill>
+                  <a:srgbClr val="000000"/>
+                </a:solidFill>
+                <a:latin typeface="Courier New" pitchFamily="49" charset="0"/>
+              </a:rPr>
+            </a:br>
+            <a:r>
+              <a:rPr lang="de-DE" altLang="de-DE" sz="1600" b="1" dirty="0" smtClean="0">
+                <a:solidFill>
+                  <a:srgbClr val="000000"/>
+                </a:solidFill>
+                <a:latin typeface="Courier New" pitchFamily="49" charset="0"/>
+              </a:rPr>
+              <a:t>// </a:t>
+            </a:r>
+            <a:r>
+              <a:rPr lang="de-DE" altLang="de-DE" sz="1600" b="1" dirty="0" err="1" smtClean="0">
+                <a:solidFill>
+                  <a:srgbClr val="000000"/>
+                </a:solidFill>
+                <a:latin typeface="Courier New" pitchFamily="49" charset="0"/>
+              </a:rPr>
+              <a:t>Init</a:t>
+            </a:r>
+            <a:endParaRPr lang="de-DE" altLang="de-DE" sz="1600" b="1" dirty="0">
+              <a:solidFill>
+                <a:srgbClr val="000000"/>
+              </a:solidFill>
+              <a:latin typeface="Courier New" pitchFamily="49" charset="0"/>
+            </a:endParaRPr>
+          </a:p>
+          <a:p>
+            <a:pPr algn="l" eaLnBrk="1" hangingPunct="1"/>
+            <a:r>
+              <a:rPr lang="de-DE" altLang="de-DE" sz="1600" b="1" dirty="0">
+                <a:solidFill>
+                  <a:srgbClr val="000000"/>
+                </a:solidFill>
+                <a:latin typeface="Courier New" pitchFamily="49" charset="0"/>
+              </a:rPr>
+              <a:t>ADCS_MD   = 3;		// ADC </a:t>
+            </a:r>
+            <a:r>
+              <a:rPr lang="de-DE" altLang="de-DE" sz="1600" b="1" dirty="0" err="1">
+                <a:solidFill>
+                  <a:srgbClr val="000000"/>
+                </a:solidFill>
+                <a:latin typeface="Courier New" pitchFamily="49" charset="0"/>
+              </a:rPr>
+              <a:t>Stop</a:t>
+            </a:r>
+            <a:r>
+              <a:rPr lang="de-DE" altLang="de-DE" sz="1600" b="1" dirty="0">
+                <a:solidFill>
+                  <a:srgbClr val="000000"/>
+                </a:solidFill>
+                <a:latin typeface="Courier New" pitchFamily="49" charset="0"/>
+              </a:rPr>
+              <a:t> Modus</a:t>
+            </a:r>
+          </a:p>
+          <a:p>
+            <a:pPr algn="l" eaLnBrk="1" hangingPunct="1"/>
+            <a:r>
+              <a:rPr lang="de-DE" altLang="de-DE" sz="1600" b="1" dirty="0">
+                <a:solidFill>
+                  <a:srgbClr val="000000"/>
+                </a:solidFill>
+                <a:latin typeface="Courier New" pitchFamily="49" charset="0"/>
+              </a:rPr>
+              <a:t>ADCS_S10  = 1;		// 8 Bit Genauigkeit</a:t>
+            </a:r>
+          </a:p>
+          <a:p>
+            <a:pPr algn="l" eaLnBrk="1" hangingPunct="1"/>
+            <a:r>
+              <a:rPr lang="de-DE" altLang="de-DE" sz="1600" b="1" dirty="0">
+                <a:solidFill>
+                  <a:srgbClr val="000000"/>
+                </a:solidFill>
+                <a:latin typeface="Courier New" pitchFamily="49" charset="0"/>
+              </a:rPr>
+              <a:t>ADER0_ADE2 = 1;	// Analoge Eingänge aktivieren: AN2 + AN3</a:t>
+            </a:r>
+          </a:p>
+          <a:p>
+            <a:pPr algn="l" eaLnBrk="1" hangingPunct="1"/>
+            <a:r>
+              <a:rPr lang="de-DE" altLang="de-DE" sz="1600" b="1" dirty="0">
+                <a:solidFill>
+                  <a:srgbClr val="000000"/>
+                </a:solidFill>
+                <a:latin typeface="Courier New" pitchFamily="49" charset="0"/>
+              </a:rPr>
+              <a:t>ADER0_ADE3 = 1;	//  (ADER0: Eingänge AN0 bis AN7)</a:t>
+            </a:r>
+          </a:p>
+          <a:p>
+            <a:pPr algn="l" eaLnBrk="1" hangingPunct="1"/>
+            <a:r>
+              <a:rPr lang="de-DE" altLang="de-DE" sz="1600" b="1" dirty="0" smtClean="0">
+                <a:solidFill>
+                  <a:srgbClr val="000000"/>
+                </a:solidFill>
+                <a:latin typeface="Courier New" pitchFamily="49" charset="0"/>
+              </a:rPr>
+              <a:t/>
+            </a:r>
+            <a:br>
+              <a:rPr lang="de-DE" altLang="de-DE" sz="1600" b="1" dirty="0" smtClean="0">
+                <a:solidFill>
+                  <a:srgbClr val="000000"/>
+                </a:solidFill>
+                <a:latin typeface="Courier New" pitchFamily="49" charset="0"/>
+              </a:rPr>
+            </a:br>
+            <a:r>
+              <a:rPr lang="de-DE" altLang="de-DE" sz="1600" b="1" dirty="0" smtClean="0">
+                <a:solidFill>
+                  <a:srgbClr val="000000"/>
+                </a:solidFill>
+                <a:latin typeface="Courier New" pitchFamily="49" charset="0"/>
+              </a:rPr>
+              <a:t>// A/D-Wandlung durchführen</a:t>
+            </a:r>
+            <a:endParaRPr lang="de-DE" altLang="de-DE" sz="1600" b="1" dirty="0">
+              <a:solidFill>
+                <a:srgbClr val="000000"/>
+              </a:solidFill>
+              <a:latin typeface="Courier New" pitchFamily="49" charset="0"/>
+            </a:endParaRPr>
+          </a:p>
+          <a:p>
+            <a:pPr algn="l" eaLnBrk="1" hangingPunct="1"/>
+            <a:r>
+              <a:rPr lang="de-DE" altLang="de-DE" sz="1600" b="1" dirty="0">
+                <a:solidFill>
+                  <a:srgbClr val="000000"/>
+                </a:solidFill>
+                <a:latin typeface="Courier New" pitchFamily="49" charset="0"/>
+              </a:rPr>
+              <a:t>ADSR = 0x6C00 + (3 &lt;&lt; 5) + 3;</a:t>
+            </a:r>
+            <a:r>
+              <a:rPr lang="de-DE" altLang="de-DE" sz="1600" b="1">
+                <a:solidFill>
+                  <a:srgbClr val="000000"/>
+                </a:solidFill>
+                <a:latin typeface="Courier New" pitchFamily="49" charset="0"/>
+              </a:rPr>
+              <a:t>	</a:t>
+            </a:r>
+            <a:r>
+              <a:rPr lang="de-DE" altLang="de-DE" sz="1600" b="1" smtClean="0">
+                <a:solidFill>
+                  <a:srgbClr val="000000"/>
+                </a:solidFill>
+                <a:latin typeface="Courier New" pitchFamily="49" charset="0"/>
+              </a:rPr>
+              <a:t>      // </a:t>
+            </a:r>
+            <a:r>
+              <a:rPr lang="de-DE" altLang="de-DE" sz="1600" b="1" dirty="0">
+                <a:solidFill>
+                  <a:srgbClr val="000000"/>
+                </a:solidFill>
+                <a:latin typeface="Courier New" pitchFamily="49" charset="0"/>
+              </a:rPr>
+              <a:t>Start- und End-Kanal 3</a:t>
+            </a:r>
+          </a:p>
+          <a:p>
+            <a:pPr algn="l" eaLnBrk="1" hangingPunct="1"/>
+            <a:endParaRPr lang="de-DE" altLang="de-DE" sz="1600" b="1" dirty="0">
+              <a:solidFill>
+                <a:srgbClr val="000000"/>
+              </a:solidFill>
+              <a:latin typeface="Courier New" pitchFamily="49" charset="0"/>
+            </a:endParaRPr>
+          </a:p>
+          <a:p>
+            <a:pPr algn="l" eaLnBrk="1" hangingPunct="1"/>
+            <a:r>
+              <a:rPr lang="de-DE" altLang="de-DE" sz="1600" b="1" dirty="0">
+                <a:solidFill>
+                  <a:srgbClr val="000000"/>
+                </a:solidFill>
+                <a:latin typeface="Courier New" pitchFamily="49" charset="0"/>
+              </a:rPr>
+              <a:t>ADCS_STRT = 1;				// A/D-Wandler starten</a:t>
+            </a:r>
+          </a:p>
+          <a:p>
+            <a:pPr algn="l" eaLnBrk="1" hangingPunct="1"/>
+            <a:r>
+              <a:rPr lang="de-DE" altLang="de-DE" sz="1600" b="1" dirty="0" err="1">
+                <a:solidFill>
+                  <a:srgbClr val="000000"/>
+                </a:solidFill>
+                <a:latin typeface="Courier New" pitchFamily="49" charset="0"/>
+              </a:rPr>
+              <a:t>while</a:t>
+            </a:r>
+            <a:r>
+              <a:rPr lang="de-DE" altLang="de-DE" sz="1600" b="1" dirty="0">
+                <a:solidFill>
+                  <a:srgbClr val="000000"/>
+                </a:solidFill>
+                <a:latin typeface="Courier New" pitchFamily="49" charset="0"/>
+              </a:rPr>
+              <a:t> (ADCS_INT == 0) { }	// Warten bis A/D-Wandlung beendet</a:t>
+            </a:r>
+          </a:p>
+          <a:p>
+            <a:pPr algn="l" eaLnBrk="1" hangingPunct="1"/>
+            <a:r>
+              <a:rPr lang="de-DE" altLang="de-DE" sz="1600" b="1" dirty="0" err="1">
+                <a:solidFill>
+                  <a:srgbClr val="000000"/>
+                </a:solidFill>
+                <a:latin typeface="Courier New" pitchFamily="49" charset="0"/>
+              </a:rPr>
+              <a:t>result</a:t>
+            </a:r>
+            <a:r>
+              <a:rPr lang="de-DE" altLang="de-DE" sz="1600" b="1" dirty="0">
+                <a:solidFill>
+                  <a:srgbClr val="000000"/>
+                </a:solidFill>
+                <a:latin typeface="Courier New" pitchFamily="49" charset="0"/>
+              </a:rPr>
+              <a:t> = ADCRL;			// Ergebnis speichern</a:t>
+            </a:r>
+          </a:p>
+          <a:p>
+            <a:pPr algn="l" eaLnBrk="1" hangingPunct="1"/>
+            <a:r>
+              <a:rPr lang="de-DE" altLang="de-DE" sz="1600" b="1" dirty="0">
+                <a:solidFill>
+                  <a:srgbClr val="000000"/>
+                </a:solidFill>
+                <a:latin typeface="Courier New" pitchFamily="49" charset="0"/>
+              </a:rPr>
+              <a:t>ADCS_INT = 0;				// Bit auf 0 für nächste Wandlung</a:t>
+            </a:r>
+          </a:p>
+        </p:txBody>
+      </p:sp>
+    </p:spTree>
+  </p:cSld>
+  <p:clrMapOvr>
+    <a:masterClrMapping/>
+  </p:clrMapOvr>
+  <p:transition spd="med"/>
+  <p:timing>
+    <p:tnLst>
+      <p:par>
+        <p:cTn id="1" dur="indefinite" restart="never" nodeType="tmRoot">
+          <p:childTnLst>
+            <p:seq concurrent="1" nextAc="seek">
+              <p:cTn id="2" dur="0" nodeType="mainSeq"/>
+              <p:prevCondLst>
+                <p:cond evt="onPrev" delay="0">
+                  <p:tgtEl>
+                    <p:sldTgt/>
+                  </p:tgtEl>
+                </p:cond>
+              </p:prevCondLst>
+              <p:nextCondLst>
+                <p:cond evt="onNext" delay="0">
+                  <p:tgtEl>
+                    <p:sldTgt/>
+                  </p:tgtEl>
+                </p:cond>
+              </p:nextCondLst>
+            </p:seq>
+          </p:childTnLst>
+        </p:cTn>
+      </p:par>
+    </p:tnLst>
+  </p:timing>
+</p:sld>
+</file>
+
+<file path=ppt/slides/slide11.xml><?xml version="1.0" encoding="utf-8"?>
+<p:sld xmlns:a="http://schemas.openxmlformats.org/drawingml/2006/main" xmlns:r="http://schemas.openxmlformats.org/officeDocument/2006/relationships" xmlns:p="http://schemas.openxmlformats.org/presentationml/2006/main">
+  <p:cSld>
+    <p:spTree>
+      <p:nvGrpSpPr>
+        <p:cNvPr id="1" name=""/>
+        <p:cNvGrpSpPr/>
+        <p:nvPr/>
+      </p:nvGrpSpPr>
+      <p:grpSpPr>
+        <a:xfrm>
+          <a:off x="0" y="0"/>
+          <a:ext cx="0" cy="0"/>
+          <a:chOff x="0" y="0"/>
+          <a:chExt cx="0" cy="0"/>
+        </a:xfrm>
+      </p:grpSpPr>
+      <p:sp>
+        <p:nvSpPr>
+          <p:cNvPr id="11266" name="Rectangle 1"/>
+          <p:cNvSpPr>
+            <a:spLocks noGrp="1" noChangeArrowheads="1"/>
+          </p:cNvSpPr>
+          <p:nvPr>
+            <p:ph type="title" idx="4294967295"/>
+          </p:nvPr>
+        </p:nvSpPr>
+        <p:spPr>
+          <a:xfrm>
+            <a:off x="358775" y="488950"/>
+            <a:ext cx="6877050" cy="838200"/>
+          </a:xfrm>
+        </p:spPr>
+        <p:txBody>
+          <a:bodyPr/>
+          <a:lstStyle/>
+          <a:p>
+            <a:pPr>
+              <a:tabLst>
+                <a:tab pos="0" algn="l"/>
+                <a:tab pos="914400" algn="l"/>
+                <a:tab pos="1828800" algn="l"/>
+                <a:tab pos="2743200" algn="l"/>
+                <a:tab pos="3657600" algn="l"/>
+                <a:tab pos="4572000" algn="l"/>
+                <a:tab pos="5486400" algn="l"/>
+                <a:tab pos="6400800" algn="l"/>
+                <a:tab pos="7315200" algn="l"/>
+                <a:tab pos="8229600" algn="l"/>
+                <a:tab pos="9144000" algn="l"/>
+                <a:tab pos="10058400" algn="l"/>
+              </a:tabLst>
+            </a:pPr>
+            <a:r>
+              <a:rPr lang="de-DE" altLang="de-DE" dirty="0" smtClean="0"/>
+              <a:t>Demo</a:t>
+            </a:r>
+            <a:endParaRPr lang="de-DE" altLang="de-DE" dirty="0" smtClean="0"/>
+          </a:p>
+        </p:txBody>
+      </p:sp>
+      <p:pic>
+        <p:nvPicPr>
+          <p:cNvPr id="5" name="Picture 3"/>
+          <p:cNvPicPr>
+            <a:picLocks noChangeAspect="1" noChangeArrowheads="1"/>
+          </p:cNvPicPr>
+          <p:nvPr/>
+        </p:nvPicPr>
+        <p:blipFill>
+          <a:blip r:embed="rId3">
+            <a:extLst>
+              <a:ext uri="{28A0092B-C50C-407E-A947-70E740481C1C}">
+                <a14:useLocalDpi xmlns:a14="http://schemas.microsoft.com/office/drawing/2010/main" val="0"/>
+              </a:ext>
+            </a:extLst>
+          </a:blip>
+          <a:srcRect/>
+          <a:stretch>
+            <a:fillRect/>
+          </a:stretch>
+        </p:blipFill>
+        <p:spPr bwMode="auto">
+          <a:xfrm>
+            <a:off x="1907704" y="1772816"/>
+            <a:ext cx="5541987" cy="4546960"/>
+          </a:xfrm>
+          <a:prstGeom prst="rect">
+            <a:avLst/>
+          </a:prstGeom>
+          <a:noFill/>
+          <a:ln>
+            <a:noFill/>
+          </a:ln>
+          <a:effectLst/>
+          <a:extLst>
+            <a:ext uri="{909E8E84-426E-40DD-AFC4-6F175D3DCCD1}">
+              <a14:hiddenFill xmlns:a14="http://schemas.microsoft.com/office/drawing/2010/main">
+                <a:blipFill dpi="0" rotWithShape="0">
+                  <a:blip/>
+                  <a:srcRect/>
+                  <a:stretch>
+                    <a:fillRect/>
+                  </a:stretch>
+                </a:blipFill>
+              </a14:hiddenFill>
+            </a:ext>
+            <a:ext uri="{91240B29-F687-4F45-9708-019B960494DF}">
+              <a14:hiddenLine xmlns:a14="http://schemas.microsoft.com/office/drawing/2010/main" w="9525">
+                <a:solidFill>
+                  <a:srgbClr val="808080"/>
+                </a:solidFill>
+                <a:round/>
+                <a:headEnd/>
+                <a:tailEnd/>
+              </a14:hiddenLine>
+            </a:ext>
+            <a:ext uri="{AF507438-7753-43E0-B8FC-AC1667EBCBE1}">
+              <a14:hiddenEffects xmlns:a14="http://schemas.microsoft.com/office/drawing/2010/main">
+                <a:effectLst>
+                  <a:outerShdw dist="35921" dir="2700000" algn="ctr" rotWithShape="0">
+                    <a:srgbClr val="808080"/>
+                  </a:outerShdw>
+                </a:effectLst>
+              </a14:hiddenEffects>
+            </a:ext>
+          </a:extLst>
+        </p:spPr>
+      </p:pic>
+    </p:spTree>
+    <p:extLst>
+      <p:ext uri="{BB962C8B-B14F-4D97-AF65-F5344CB8AC3E}">
+        <p14:creationId xmlns:p14="http://schemas.microsoft.com/office/powerpoint/2010/main" val="1828527647"/>
+      </p:ext>
+    </p:extLst>
+  </p:cSld>
+  <p:clrMapOvr>
+    <a:masterClrMapping/>
+  </p:clrMapOvr>
+  <p:transition spd="med"/>
+  <p:timing>
+    <p:tnLst>
+      <p:par>
+        <p:cTn id="1" dur="indefinite" restart="never" nodeType="tmRoot">
+          <p:childTnLst>
+            <p:seq concurrent="1" nextAc="seek">
+              <p:cTn id="2" dur="0" nodeType="mainSeq"/>
+              <p:prevCondLst>
+                <p:cond evt="onPrev" delay="0">
+                  <p:tgtEl>
+                    <p:sldTgt/>
+                  </p:tgtEl>
+                </p:cond>
+              </p:prevCondLst>
+              <p:nextCondLst>
+                <p:cond evt="onNext" delay="0">
+                  <p:tgtEl>
+                    <p:sldTgt/>
+                  </p:tgtEl>
+                </p:cond>
+              </p:nextCondLst>
+            </p:seq>
+          </p:childTnLst>
+        </p:cTn>
+      </p:par>
+    </p:tnLst>
+  </p:timing>
+</p:sld>
+</file>
+
 <file path=ppt/slides/slide2.xml><?xml version="1.0" encoding="utf-8"?>
 <p:sld xmlns:a="http://schemas.openxmlformats.org/drawingml/2006/main" xmlns:r="http://schemas.openxmlformats.org/officeDocument/2006/relationships" xmlns:p="http://schemas.openxmlformats.org/presentationml/2006/main">
   <p:cSld>
@@ -20222,526 +22848,10 @@
               </a:tabLst>
             </a:pPr>
             <a:r>
-              <a:rPr lang="de-DE" altLang="de-DE" smtClean="0"/>
-              <a:t>Zugriff auf Pins</a:t>
-            </a:r>
-          </a:p>
-        </p:txBody>
-      </p:sp>
-      <p:sp>
-        <p:nvSpPr>
-          <p:cNvPr id="10244" name="Text Box 3"/>
-          <p:cNvSpPr txBox="1">
-            <a:spLocks noChangeArrowheads="1"/>
-          </p:cNvSpPr>
-          <p:nvPr/>
-        </p:nvSpPr>
-        <p:spPr bwMode="auto">
-          <a:xfrm>
-            <a:off x="608677" y="3887787"/>
-            <a:ext cx="8101012" cy="1628775"/>
-          </a:xfrm>
-          <a:prstGeom prst="rect">
-            <a:avLst/>
-          </a:prstGeom>
-          <a:solidFill>
-            <a:srgbClr val="C0C0C0"/>
-          </a:solidFill>
-          <a:ln>
-            <a:noFill/>
-          </a:ln>
-          <a:effectLst/>
-          <a:extLst>
-            <a:ext uri="{91240B29-F687-4F45-9708-019B960494DF}">
-              <a14:hiddenLine xmlns:a14="http://schemas.microsoft.com/office/drawing/2010/main" w="9525">
-                <a:solidFill>
-                  <a:srgbClr val="000000"/>
-                </a:solidFill>
-                <a:round/>
-                <a:headEnd/>
-                <a:tailEnd/>
-              </a14:hiddenLine>
-            </a:ext>
-            <a:ext uri="{AF507438-7753-43E0-B8FC-AC1667EBCBE1}">
-              <a14:hiddenEffects xmlns:a14="http://schemas.microsoft.com/office/drawing/2010/main">
-                <a:effectLst>
-                  <a:outerShdw dist="35921" dir="2700000" algn="ctr" rotWithShape="0">
-                    <a:srgbClr val="808080"/>
-                  </a:outerShdw>
-                </a:effectLst>
-              </a14:hiddenEffects>
-            </a:ext>
-          </a:extLst>
-        </p:spPr>
-        <p:txBody>
-          <a:bodyPr lIns="90000" tIns="45000" rIns="90000" bIns="45000"/>
-          <a:lstStyle>
-            <a:lvl1pPr eaLnBrk="0" hangingPunct="0">
-              <a:tabLst>
-                <a:tab pos="0" algn="l"/>
-                <a:tab pos="447675" algn="l"/>
-                <a:tab pos="896938" algn="l"/>
-                <a:tab pos="1346200" algn="l"/>
-                <a:tab pos="1795463" algn="l"/>
-                <a:tab pos="2244725" algn="l"/>
-                <a:tab pos="2693988" algn="l"/>
-                <a:tab pos="3143250" algn="l"/>
-                <a:tab pos="3592513" algn="l"/>
-                <a:tab pos="4041775" algn="l"/>
-                <a:tab pos="4491038" algn="l"/>
-                <a:tab pos="4940300" algn="l"/>
-                <a:tab pos="5389563" algn="l"/>
-                <a:tab pos="5838825" algn="l"/>
-                <a:tab pos="6288088" algn="l"/>
-                <a:tab pos="6737350" algn="l"/>
-                <a:tab pos="7186613" algn="l"/>
-                <a:tab pos="7635875" algn="l"/>
-                <a:tab pos="8085138" algn="l"/>
-                <a:tab pos="8534400" algn="l"/>
-                <a:tab pos="8983663" algn="l"/>
-              </a:tabLst>
-              <a:defRPr sz="2400">
-                <a:solidFill>
-                  <a:schemeClr val="bg1"/>
-                </a:solidFill>
-                <a:latin typeface="Arial" charset="0"/>
-                <a:ea typeface="ＭＳ Ｐゴシック" charset="-128"/>
-              </a:defRPr>
-            </a:lvl1pPr>
-            <a:lvl2pPr eaLnBrk="0" hangingPunct="0">
-              <a:tabLst>
-                <a:tab pos="0" algn="l"/>
-                <a:tab pos="447675" algn="l"/>
-                <a:tab pos="896938" algn="l"/>
-                <a:tab pos="1346200" algn="l"/>
-                <a:tab pos="1795463" algn="l"/>
-                <a:tab pos="2244725" algn="l"/>
-                <a:tab pos="2693988" algn="l"/>
-                <a:tab pos="3143250" algn="l"/>
-                <a:tab pos="3592513" algn="l"/>
-                <a:tab pos="4041775" algn="l"/>
-                <a:tab pos="4491038" algn="l"/>
-                <a:tab pos="4940300" algn="l"/>
-                <a:tab pos="5389563" algn="l"/>
-                <a:tab pos="5838825" algn="l"/>
-                <a:tab pos="6288088" algn="l"/>
-                <a:tab pos="6737350" algn="l"/>
-                <a:tab pos="7186613" algn="l"/>
-                <a:tab pos="7635875" algn="l"/>
-                <a:tab pos="8085138" algn="l"/>
-                <a:tab pos="8534400" algn="l"/>
-                <a:tab pos="8983663" algn="l"/>
-              </a:tabLst>
-              <a:defRPr sz="2400">
-                <a:solidFill>
-                  <a:schemeClr val="bg1"/>
-                </a:solidFill>
-                <a:latin typeface="Arial" charset="0"/>
-                <a:ea typeface="ＭＳ Ｐゴシック" charset="-128"/>
-              </a:defRPr>
-            </a:lvl2pPr>
-            <a:lvl3pPr eaLnBrk="0" hangingPunct="0">
-              <a:tabLst>
-                <a:tab pos="0" algn="l"/>
-                <a:tab pos="447675" algn="l"/>
-                <a:tab pos="896938" algn="l"/>
-                <a:tab pos="1346200" algn="l"/>
-                <a:tab pos="1795463" algn="l"/>
-                <a:tab pos="2244725" algn="l"/>
-                <a:tab pos="2693988" algn="l"/>
-                <a:tab pos="3143250" algn="l"/>
-                <a:tab pos="3592513" algn="l"/>
-                <a:tab pos="4041775" algn="l"/>
-                <a:tab pos="4491038" algn="l"/>
-                <a:tab pos="4940300" algn="l"/>
-                <a:tab pos="5389563" algn="l"/>
-                <a:tab pos="5838825" algn="l"/>
-                <a:tab pos="6288088" algn="l"/>
-                <a:tab pos="6737350" algn="l"/>
-                <a:tab pos="7186613" algn="l"/>
-                <a:tab pos="7635875" algn="l"/>
-                <a:tab pos="8085138" algn="l"/>
-                <a:tab pos="8534400" algn="l"/>
-                <a:tab pos="8983663" algn="l"/>
-              </a:tabLst>
-              <a:defRPr sz="2400">
-                <a:solidFill>
-                  <a:schemeClr val="bg1"/>
-                </a:solidFill>
-                <a:latin typeface="Arial" charset="0"/>
-                <a:ea typeface="ＭＳ Ｐゴシック" charset="-128"/>
-              </a:defRPr>
-            </a:lvl3pPr>
-            <a:lvl4pPr eaLnBrk="0" hangingPunct="0">
-              <a:tabLst>
-                <a:tab pos="0" algn="l"/>
-                <a:tab pos="447675" algn="l"/>
-                <a:tab pos="896938" algn="l"/>
-                <a:tab pos="1346200" algn="l"/>
-                <a:tab pos="1795463" algn="l"/>
-                <a:tab pos="2244725" algn="l"/>
-                <a:tab pos="2693988" algn="l"/>
-                <a:tab pos="3143250" algn="l"/>
-                <a:tab pos="3592513" algn="l"/>
-                <a:tab pos="4041775" algn="l"/>
-                <a:tab pos="4491038" algn="l"/>
-                <a:tab pos="4940300" algn="l"/>
-                <a:tab pos="5389563" algn="l"/>
-                <a:tab pos="5838825" algn="l"/>
-                <a:tab pos="6288088" algn="l"/>
-                <a:tab pos="6737350" algn="l"/>
-                <a:tab pos="7186613" algn="l"/>
-                <a:tab pos="7635875" algn="l"/>
-                <a:tab pos="8085138" algn="l"/>
-                <a:tab pos="8534400" algn="l"/>
-                <a:tab pos="8983663" algn="l"/>
-              </a:tabLst>
-              <a:defRPr sz="2400">
-                <a:solidFill>
-                  <a:schemeClr val="bg1"/>
-                </a:solidFill>
-                <a:latin typeface="Arial" charset="0"/>
-                <a:ea typeface="ＭＳ Ｐゴシック" charset="-128"/>
-              </a:defRPr>
-            </a:lvl4pPr>
-            <a:lvl5pPr eaLnBrk="0" hangingPunct="0">
-              <a:tabLst>
-                <a:tab pos="0" algn="l"/>
-                <a:tab pos="447675" algn="l"/>
-                <a:tab pos="896938" algn="l"/>
-                <a:tab pos="1346200" algn="l"/>
-                <a:tab pos="1795463" algn="l"/>
-                <a:tab pos="2244725" algn="l"/>
-                <a:tab pos="2693988" algn="l"/>
-                <a:tab pos="3143250" algn="l"/>
-                <a:tab pos="3592513" algn="l"/>
-                <a:tab pos="4041775" algn="l"/>
-                <a:tab pos="4491038" algn="l"/>
-                <a:tab pos="4940300" algn="l"/>
-                <a:tab pos="5389563" algn="l"/>
-                <a:tab pos="5838825" algn="l"/>
-                <a:tab pos="6288088" algn="l"/>
-                <a:tab pos="6737350" algn="l"/>
-                <a:tab pos="7186613" algn="l"/>
-                <a:tab pos="7635875" algn="l"/>
-                <a:tab pos="8085138" algn="l"/>
-                <a:tab pos="8534400" algn="l"/>
-                <a:tab pos="8983663" algn="l"/>
-              </a:tabLst>
-              <a:defRPr sz="2400">
-                <a:solidFill>
-                  <a:schemeClr val="bg1"/>
-                </a:solidFill>
-                <a:latin typeface="Arial" charset="0"/>
-                <a:ea typeface="ＭＳ Ｐゴシック" charset="-128"/>
-              </a:defRPr>
-            </a:lvl5pPr>
-            <a:lvl6pPr marL="2514600" indent="-228600" algn="ctr" defTabSz="449263" eaLnBrk="0" fontAlgn="base" hangingPunct="0">
-              <a:lnSpc>
-                <a:spcPct val="93000"/>
-              </a:lnSpc>
-              <a:spcBef>
-                <a:spcPct val="0"/>
-              </a:spcBef>
-              <a:spcAft>
-                <a:spcPct val="0"/>
-              </a:spcAft>
-              <a:buClr>
-                <a:srgbClr val="000000"/>
-              </a:buClr>
-              <a:buSzPct val="100000"/>
-              <a:buFont typeface="Times New Roman" pitchFamily="16" charset="0"/>
-              <a:tabLst>
-                <a:tab pos="0" algn="l"/>
-                <a:tab pos="447675" algn="l"/>
-                <a:tab pos="896938" algn="l"/>
-                <a:tab pos="1346200" algn="l"/>
-                <a:tab pos="1795463" algn="l"/>
-                <a:tab pos="2244725" algn="l"/>
-                <a:tab pos="2693988" algn="l"/>
-                <a:tab pos="3143250" algn="l"/>
-                <a:tab pos="3592513" algn="l"/>
-                <a:tab pos="4041775" algn="l"/>
-                <a:tab pos="4491038" algn="l"/>
-                <a:tab pos="4940300" algn="l"/>
-                <a:tab pos="5389563" algn="l"/>
-                <a:tab pos="5838825" algn="l"/>
-                <a:tab pos="6288088" algn="l"/>
-                <a:tab pos="6737350" algn="l"/>
-                <a:tab pos="7186613" algn="l"/>
-                <a:tab pos="7635875" algn="l"/>
-                <a:tab pos="8085138" algn="l"/>
-                <a:tab pos="8534400" algn="l"/>
-                <a:tab pos="8983663" algn="l"/>
-              </a:tabLst>
-              <a:defRPr sz="2400">
-                <a:solidFill>
-                  <a:schemeClr val="bg1"/>
-                </a:solidFill>
-                <a:latin typeface="Arial" charset="0"/>
-                <a:ea typeface="ＭＳ Ｐゴシック" charset="-128"/>
-              </a:defRPr>
-            </a:lvl6pPr>
-            <a:lvl7pPr marL="2971800" indent="-228600" algn="ctr" defTabSz="449263" eaLnBrk="0" fontAlgn="base" hangingPunct="0">
-              <a:lnSpc>
-                <a:spcPct val="93000"/>
-              </a:lnSpc>
-              <a:spcBef>
-                <a:spcPct val="0"/>
-              </a:spcBef>
-              <a:spcAft>
-                <a:spcPct val="0"/>
-              </a:spcAft>
-              <a:buClr>
-                <a:srgbClr val="000000"/>
-              </a:buClr>
-              <a:buSzPct val="100000"/>
-              <a:buFont typeface="Times New Roman" pitchFamily="16" charset="0"/>
-              <a:tabLst>
-                <a:tab pos="0" algn="l"/>
-                <a:tab pos="447675" algn="l"/>
-                <a:tab pos="896938" algn="l"/>
-                <a:tab pos="1346200" algn="l"/>
-                <a:tab pos="1795463" algn="l"/>
-                <a:tab pos="2244725" algn="l"/>
-                <a:tab pos="2693988" algn="l"/>
-                <a:tab pos="3143250" algn="l"/>
-                <a:tab pos="3592513" algn="l"/>
-                <a:tab pos="4041775" algn="l"/>
-                <a:tab pos="4491038" algn="l"/>
-                <a:tab pos="4940300" algn="l"/>
-                <a:tab pos="5389563" algn="l"/>
-                <a:tab pos="5838825" algn="l"/>
-                <a:tab pos="6288088" algn="l"/>
-                <a:tab pos="6737350" algn="l"/>
-                <a:tab pos="7186613" algn="l"/>
-                <a:tab pos="7635875" algn="l"/>
-                <a:tab pos="8085138" algn="l"/>
-                <a:tab pos="8534400" algn="l"/>
-                <a:tab pos="8983663" algn="l"/>
-              </a:tabLst>
-              <a:defRPr sz="2400">
-                <a:solidFill>
-                  <a:schemeClr val="bg1"/>
-                </a:solidFill>
-                <a:latin typeface="Arial" charset="0"/>
-                <a:ea typeface="ＭＳ Ｐゴシック" charset="-128"/>
-              </a:defRPr>
-            </a:lvl7pPr>
-            <a:lvl8pPr marL="3429000" indent="-228600" algn="ctr" defTabSz="449263" eaLnBrk="0" fontAlgn="base" hangingPunct="0">
-              <a:lnSpc>
-                <a:spcPct val="93000"/>
-              </a:lnSpc>
-              <a:spcBef>
-                <a:spcPct val="0"/>
-              </a:spcBef>
-              <a:spcAft>
-                <a:spcPct val="0"/>
-              </a:spcAft>
-              <a:buClr>
-                <a:srgbClr val="000000"/>
-              </a:buClr>
-              <a:buSzPct val="100000"/>
-              <a:buFont typeface="Times New Roman" pitchFamily="16" charset="0"/>
-              <a:tabLst>
-                <a:tab pos="0" algn="l"/>
-                <a:tab pos="447675" algn="l"/>
-                <a:tab pos="896938" algn="l"/>
-                <a:tab pos="1346200" algn="l"/>
-                <a:tab pos="1795463" algn="l"/>
-                <a:tab pos="2244725" algn="l"/>
-                <a:tab pos="2693988" algn="l"/>
-                <a:tab pos="3143250" algn="l"/>
-                <a:tab pos="3592513" algn="l"/>
-                <a:tab pos="4041775" algn="l"/>
-                <a:tab pos="4491038" algn="l"/>
-                <a:tab pos="4940300" algn="l"/>
-                <a:tab pos="5389563" algn="l"/>
-                <a:tab pos="5838825" algn="l"/>
-                <a:tab pos="6288088" algn="l"/>
-                <a:tab pos="6737350" algn="l"/>
-                <a:tab pos="7186613" algn="l"/>
-                <a:tab pos="7635875" algn="l"/>
-                <a:tab pos="8085138" algn="l"/>
-                <a:tab pos="8534400" algn="l"/>
-                <a:tab pos="8983663" algn="l"/>
-              </a:tabLst>
-              <a:defRPr sz="2400">
-                <a:solidFill>
-                  <a:schemeClr val="bg1"/>
-                </a:solidFill>
-                <a:latin typeface="Arial" charset="0"/>
-                <a:ea typeface="ＭＳ Ｐゴシック" charset="-128"/>
-              </a:defRPr>
-            </a:lvl8pPr>
-            <a:lvl9pPr marL="3886200" indent="-228600" algn="ctr" defTabSz="449263" eaLnBrk="0" fontAlgn="base" hangingPunct="0">
-              <a:lnSpc>
-                <a:spcPct val="93000"/>
-              </a:lnSpc>
-              <a:spcBef>
-                <a:spcPct val="0"/>
-              </a:spcBef>
-              <a:spcAft>
-                <a:spcPct val="0"/>
-              </a:spcAft>
-              <a:buClr>
-                <a:srgbClr val="000000"/>
-              </a:buClr>
-              <a:buSzPct val="100000"/>
-              <a:buFont typeface="Times New Roman" pitchFamily="16" charset="0"/>
-              <a:tabLst>
-                <a:tab pos="0" algn="l"/>
-                <a:tab pos="447675" algn="l"/>
-                <a:tab pos="896938" algn="l"/>
-                <a:tab pos="1346200" algn="l"/>
-                <a:tab pos="1795463" algn="l"/>
-                <a:tab pos="2244725" algn="l"/>
-                <a:tab pos="2693988" algn="l"/>
-                <a:tab pos="3143250" algn="l"/>
-                <a:tab pos="3592513" algn="l"/>
-                <a:tab pos="4041775" algn="l"/>
-                <a:tab pos="4491038" algn="l"/>
-                <a:tab pos="4940300" algn="l"/>
-                <a:tab pos="5389563" algn="l"/>
-                <a:tab pos="5838825" algn="l"/>
-                <a:tab pos="6288088" algn="l"/>
-                <a:tab pos="6737350" algn="l"/>
-                <a:tab pos="7186613" algn="l"/>
-                <a:tab pos="7635875" algn="l"/>
-                <a:tab pos="8085138" algn="l"/>
-                <a:tab pos="8534400" algn="l"/>
-                <a:tab pos="8983663" algn="l"/>
-              </a:tabLst>
-              <a:defRPr sz="2400">
-                <a:solidFill>
-                  <a:schemeClr val="bg1"/>
-                </a:solidFill>
-                <a:latin typeface="Arial" charset="0"/>
-                <a:ea typeface="ＭＳ Ｐゴシック" charset="-128"/>
-              </a:defRPr>
-            </a:lvl9pPr>
-          </a:lstStyle>
-          <a:p>
-            <a:pPr algn="l" eaLnBrk="1" hangingPunct="1"/>
-            <a:r>
-              <a:rPr lang="de-DE" altLang="de-DE" sz="1600" b="1" dirty="0">
-                <a:solidFill>
-                  <a:srgbClr val="000000"/>
-                </a:solidFill>
-                <a:latin typeface="Courier New" pitchFamily="49" charset="0"/>
-              </a:rPr>
-              <a:t>/* Beispiel: Pins als Ausgang */</a:t>
-            </a:r>
-          </a:p>
-          <a:p>
-            <a:pPr algn="l" eaLnBrk="1" hangingPunct="1"/>
-            <a:r>
-              <a:rPr lang="de-DE" altLang="de-DE" sz="1600" b="1" dirty="0">
-                <a:solidFill>
-                  <a:srgbClr val="000000"/>
-                </a:solidFill>
-                <a:latin typeface="Courier New" pitchFamily="49" charset="0"/>
-              </a:rPr>
-              <a:t>DDR00 = 0xff;	// Alle Pins von Port 00 als Output</a:t>
-            </a:r>
-          </a:p>
-          <a:p>
-            <a:pPr algn="l" eaLnBrk="1" hangingPunct="1"/>
-            <a:r>
-              <a:rPr lang="de-DE" altLang="de-DE" sz="1600" b="1" dirty="0">
-                <a:solidFill>
-                  <a:srgbClr val="000000"/>
-                </a:solidFill>
-                <a:latin typeface="Courier New" pitchFamily="49" charset="0"/>
-              </a:rPr>
-              <a:t>PDR00 = 0xff;	// Alle Pins von Port 00 auf High-Pegel</a:t>
-            </a:r>
-          </a:p>
-          <a:p>
-            <a:pPr algn="l" eaLnBrk="1" hangingPunct="1"/>
-            <a:r>
-              <a:rPr lang="de-DE" altLang="de-DE" sz="1600" b="1" dirty="0">
-                <a:solidFill>
-                  <a:srgbClr val="000000"/>
-                </a:solidFill>
-                <a:latin typeface="Courier New" pitchFamily="49" charset="0"/>
-              </a:rPr>
-              <a:t>					</a:t>
-            </a:r>
-            <a:r>
-              <a:rPr lang="de-DE" altLang="de-DE" sz="1600" b="1" dirty="0" smtClean="0">
-                <a:solidFill>
-                  <a:srgbClr val="000000"/>
-                </a:solidFill>
-                <a:latin typeface="Courier New" pitchFamily="49" charset="0"/>
-              </a:rPr>
-              <a:t>// </a:t>
-            </a:r>
-            <a:r>
-              <a:rPr lang="de-DE" altLang="de-DE" sz="1600" b="1" dirty="0">
-                <a:solidFill>
-                  <a:srgbClr val="000000"/>
-                </a:solidFill>
-                <a:latin typeface="Courier New" pitchFamily="49" charset="0"/>
-              </a:rPr>
-              <a:t>-&gt; Rechte 7-Segment-Anzeige komplett aus</a:t>
-            </a:r>
-            <a:br>
-              <a:rPr lang="de-DE" altLang="de-DE" sz="1600" b="1" dirty="0">
-                <a:solidFill>
-                  <a:srgbClr val="000000"/>
-                </a:solidFill>
-                <a:latin typeface="Courier New" pitchFamily="49" charset="0"/>
-              </a:rPr>
-            </a:br>
-            <a:endParaRPr lang="de-DE" altLang="de-DE" sz="1600" b="1" dirty="0">
-              <a:solidFill>
-                <a:srgbClr val="000000"/>
-              </a:solidFill>
-              <a:latin typeface="Courier New" pitchFamily="49" charset="0"/>
-            </a:endParaRPr>
-          </a:p>
-          <a:p>
-            <a:pPr algn="l" eaLnBrk="1" hangingPunct="1"/>
-            <a:r>
-              <a:rPr lang="de-DE" altLang="de-DE" sz="1600" b="1" dirty="0">
-                <a:solidFill>
-                  <a:srgbClr val="000000"/>
-                </a:solidFill>
-                <a:latin typeface="Courier New" pitchFamily="49" charset="0"/>
-              </a:rPr>
-              <a:t>PDR00_P7 = 0;	// Pin 7 von Port 00 auf Low-Pegel</a:t>
-            </a:r>
-          </a:p>
-          <a:p>
-            <a:pPr algn="l" eaLnBrk="1" hangingPunct="1"/>
-            <a:r>
-              <a:rPr lang="de-DE" altLang="de-DE" sz="1600" b="1" dirty="0">
-                <a:solidFill>
-                  <a:srgbClr val="000000"/>
-                </a:solidFill>
-                <a:latin typeface="Courier New" pitchFamily="49" charset="0"/>
-              </a:rPr>
-              <a:t>					</a:t>
-            </a:r>
-            <a:r>
-              <a:rPr lang="de-DE" altLang="de-DE" sz="1600" b="1" dirty="0" smtClean="0">
-                <a:solidFill>
-                  <a:srgbClr val="000000"/>
-                </a:solidFill>
-                <a:latin typeface="Courier New" pitchFamily="49" charset="0"/>
-              </a:rPr>
-              <a:t>// </a:t>
-            </a:r>
-            <a:r>
-              <a:rPr lang="de-DE" altLang="de-DE" sz="1600" b="1" dirty="0">
-                <a:solidFill>
-                  <a:srgbClr val="000000"/>
-                </a:solidFill>
-                <a:latin typeface="Courier New" pitchFamily="49" charset="0"/>
-              </a:rPr>
-              <a:t>-&gt; Punkt der rechten 7-Segment-Anzeige an</a:t>
-            </a:r>
+              <a:rPr lang="de-DE" altLang="de-DE" dirty="0" smtClean="0"/>
+              <a:t>Pins abfragen</a:t>
+            </a:r>
+            <a:endParaRPr lang="de-DE" altLang="de-DE" dirty="0" smtClean="0"/>
           </a:p>
         </p:txBody>
       </p:sp>
@@ -21328,14 +23438,6 @@
 <file path=ppt/slides/slide9.xml><?xml version="1.0" encoding="utf-8"?>
 <p:sld xmlns:a="http://schemas.openxmlformats.org/drawingml/2006/main" xmlns:r="http://schemas.openxmlformats.org/officeDocument/2006/relationships" xmlns:p="http://schemas.openxmlformats.org/presentationml/2006/main">
   <p:cSld>
-    <p:bg>
-      <p:bgPr>
-        <a:solidFill>
-          <a:srgbClr val="FFFFFF"/>
-        </a:solidFill>
-        <a:effectLst/>
-      </p:bgPr>
-    </p:bg>
     <p:spTree>
       <p:nvGrpSpPr>
         <p:cNvPr id="1" name=""/>
@@ -21352,7 +23454,7 @@
       </p:grpSpPr>
       <p:sp>
         <p:nvSpPr>
-          <p:cNvPr id="11266" name="Rectangle 1"/>
+          <p:cNvPr id="10242" name="Rectangle 1"/>
           <p:cNvSpPr>
             <a:spLocks noGrp="1" noChangeArrowheads="1"/>
           </p:cNvSpPr>
@@ -21387,136 +23489,16 @@
               </a:tabLst>
             </a:pPr>
             <a:r>
-              <a:rPr lang="de-DE" altLang="de-DE" smtClean="0"/>
-              <a:t>Analog/Digital-Wandler</a:t>
-            </a:r>
+              <a:rPr lang="de-DE" altLang="de-DE" dirty="0" smtClean="0"/>
+              <a:t>7-Segment-Anzeige</a:t>
+            </a:r>
+            <a:endParaRPr lang="de-DE" altLang="de-DE" dirty="0" smtClean="0"/>
           </a:p>
         </p:txBody>
       </p:sp>
       <p:sp>
         <p:nvSpPr>
-          <p:cNvPr id="11267" name="Rectangle 2"/>
-          <p:cNvSpPr>
-            <a:spLocks noGrp="1" noChangeArrowheads="1"/>
-          </p:cNvSpPr>
-          <p:nvPr>
-            <p:ph type="body" idx="4294967295"/>
-          </p:nvPr>
-        </p:nvSpPr>
-        <p:spPr>
-          <a:xfrm>
-            <a:off x="250825" y="1484313"/>
-            <a:ext cx="8640763" cy="4968875"/>
-          </a:xfrm>
-        </p:spPr>
-        <p:txBody>
-          <a:bodyPr/>
-          <a:lstStyle/>
-          <a:p>
-            <a:pPr marL="347663" lvl="1" indent="-168275">
-              <a:buFont typeface="Wingdings" charset="2"/>
-              <a:buChar char=""/>
-              <a:tabLst>
-                <a:tab pos="911225" algn="l"/>
-                <a:tab pos="1825625" algn="l"/>
-                <a:tab pos="2740025" algn="l"/>
-                <a:tab pos="3654425" algn="l"/>
-                <a:tab pos="4568825" algn="l"/>
-                <a:tab pos="5483225" algn="l"/>
-                <a:tab pos="6397625" algn="l"/>
-                <a:tab pos="7312025" algn="l"/>
-                <a:tab pos="8226425" algn="l"/>
-                <a:tab pos="9140825" algn="l"/>
-                <a:tab pos="10055225" algn="l"/>
-              </a:tabLst>
-            </a:pPr>
-            <a:r>
-              <a:rPr lang="de-DE" altLang="de-DE" smtClean="0"/>
-              <a:t>8 Bit oder 10 Bit Genauigkeit (wir verwenden 8 Bit)</a:t>
-            </a:r>
-          </a:p>
-          <a:p>
-            <a:pPr marL="347663" lvl="1" indent="-168275">
-              <a:buFont typeface="Wingdings" charset="2"/>
-              <a:buChar char=""/>
-              <a:tabLst>
-                <a:tab pos="911225" algn="l"/>
-                <a:tab pos="1825625" algn="l"/>
-                <a:tab pos="2740025" algn="l"/>
-                <a:tab pos="3654425" algn="l"/>
-                <a:tab pos="4568825" algn="l"/>
-                <a:tab pos="5483225" algn="l"/>
-                <a:tab pos="6397625" algn="l"/>
-                <a:tab pos="7312025" algn="l"/>
-                <a:tab pos="8226425" algn="l"/>
-                <a:tab pos="9140825" algn="l"/>
-                <a:tab pos="10055225" algn="l"/>
-              </a:tabLst>
-            </a:pPr>
-            <a:r>
-              <a:rPr lang="de-DE" altLang="de-DE" smtClean="0"/>
-              <a:t>Verschiedene Wandlungsmodi (z.B. mehrere Eingänge sequentiell wandeln)</a:t>
-            </a:r>
-          </a:p>
-          <a:p>
-            <a:pPr marL="536575" lvl="2" indent="-185738">
-              <a:buFont typeface="Wingdings" charset="2"/>
-              <a:buChar char=""/>
-              <a:tabLst>
-                <a:tab pos="911225" algn="l"/>
-                <a:tab pos="1825625" algn="l"/>
-                <a:tab pos="2740025" algn="l"/>
-                <a:tab pos="3654425" algn="l"/>
-                <a:tab pos="4568825" algn="l"/>
-                <a:tab pos="5483225" algn="l"/>
-                <a:tab pos="6397625" algn="l"/>
-                <a:tab pos="7312025" algn="l"/>
-                <a:tab pos="8226425" algn="l"/>
-                <a:tab pos="9140825" algn="l"/>
-                <a:tab pos="10055225" algn="l"/>
-              </a:tabLst>
-            </a:pPr>
-            <a:r>
-              <a:rPr lang="de-DE" altLang="de-DE" smtClean="0"/>
-              <a:t>Wir verwenden </a:t>
-            </a:r>
-            <a:r>
-              <a:rPr lang="de-DE" altLang="de-DE" b="1" smtClean="0"/>
-              <a:t>Stop Mode</a:t>
-            </a:r>
-            <a:r>
-              <a:rPr lang="de-DE" altLang="de-DE" smtClean="0"/>
-              <a:t>: ein Kanal wird einmal pro Startsignal gewandelt</a:t>
-            </a:r>
-          </a:p>
-          <a:p>
-            <a:pPr marL="536575" lvl="2" indent="-185738">
-              <a:buFont typeface="Wingdings" charset="2"/>
-              <a:buChar char=""/>
-              <a:tabLst>
-                <a:tab pos="911225" algn="l"/>
-                <a:tab pos="1825625" algn="l"/>
-                <a:tab pos="2740025" algn="l"/>
-                <a:tab pos="3654425" algn="l"/>
-                <a:tab pos="4568825" algn="l"/>
-                <a:tab pos="5483225" algn="l"/>
-                <a:tab pos="6397625" algn="l"/>
-                <a:tab pos="7312025" algn="l"/>
-                <a:tab pos="8226425" algn="l"/>
-                <a:tab pos="9140825" algn="l"/>
-                <a:tab pos="10055225" algn="l"/>
-              </a:tabLst>
-            </a:pPr>
-            <a:r>
-              <a:rPr lang="de-DE" altLang="de-DE" smtClean="0"/>
-              <a:t>Start- und Endkanal erhalten bei jeder Wandlung einen identischen Wert</a:t>
-            </a:r>
-          </a:p>
-        </p:txBody>
-      </p:sp>
-      <p:sp>
-        <p:nvSpPr>
-          <p:cNvPr id="11268" name="Text Box 3"/>
+          <p:cNvPr id="10244" name="Text Box 3"/>
           <p:cNvSpPr txBox="1">
             <a:spLocks noChangeArrowheads="1"/>
           </p:cNvSpPr>
@@ -21524,8 +23506,8 @@
         </p:nvSpPr>
         <p:spPr bwMode="auto">
           <a:xfrm>
-            <a:off x="647700" y="3073400"/>
-            <a:ext cx="7775575" cy="3341688"/>
+            <a:off x="539552" y="1700808"/>
+            <a:ext cx="8101012" cy="1628775"/>
           </a:xfrm>
           <a:prstGeom prst="rect">
             <a:avLst/>
@@ -21916,20 +23898,23 @@
                 </a:solidFill>
                 <a:latin typeface="Courier New" pitchFamily="49" charset="0"/>
               </a:rPr>
-              <a:t>/* Beispiel */</a:t>
+              <a:t>/* Beispiel: Pins als Ausgang */</a:t>
             </a:r>
           </a:p>
           <a:p>
             <a:pPr algn="l" eaLnBrk="1" hangingPunct="1"/>
             <a:r>
-              <a:rPr lang="de-DE" altLang="de-DE" sz="1600" b="1" dirty="0" err="1">
+              <a:rPr lang="de-DE" altLang="de-DE" sz="1600" b="1" dirty="0">
                 <a:solidFill>
                   <a:srgbClr val="000000"/>
                 </a:solidFill>
                 <a:latin typeface="Courier New" pitchFamily="49" charset="0"/>
               </a:rPr>
-              <a:t>unsigned</a:t>
-            </a:r>
+              <a:t>DDR00 = 0xff;	// Alle Pins von Port 00 als Output</a:t>
+            </a:r>
+          </a:p>
+          <a:p>
+            <a:pPr algn="l" eaLnBrk="1" hangingPunct="1"/>
             <a:r>
               <a:rPr lang="de-DE" altLang="de-DE" sz="1600" b="1" dirty="0">
                 <a:solidFill>
@@ -21937,48 +23922,47 @@
                 </a:solidFill>
                 <a:latin typeface="Courier New" pitchFamily="49" charset="0"/>
               </a:rPr>
-              <a:t> </a:t>
-            </a:r>
-            <a:r>
-              <a:rPr lang="de-DE" altLang="de-DE" sz="1600" b="1" dirty="0" err="1">
+              <a:t>PDR00 = 0xff;	// Alle Pins von Port 00 auf High-Pegel</a:t>
+            </a:r>
+          </a:p>
+          <a:p>
+            <a:pPr algn="l" eaLnBrk="1" hangingPunct="1"/>
+            <a:r>
+              <a:rPr lang="de-DE" altLang="de-DE" sz="1600" b="1" dirty="0">
                 <a:solidFill>
                   <a:srgbClr val="000000"/>
                 </a:solidFill>
                 <a:latin typeface="Courier New" pitchFamily="49" charset="0"/>
               </a:rPr>
-              <a:t>char</a:t>
-            </a:r>
-            <a:r>
-              <a:rPr lang="de-DE" altLang="de-DE" sz="1600" b="1" dirty="0">
+              <a:t>					</a:t>
+            </a:r>
+            <a:r>
+              <a:rPr lang="de-DE" altLang="de-DE" sz="1600" b="1" dirty="0" smtClean="0">
                 <a:solidFill>
                   <a:srgbClr val="000000"/>
                 </a:solidFill>
                 <a:latin typeface="Courier New" pitchFamily="49" charset="0"/>
               </a:rPr>
-              <a:t> </a:t>
-            </a:r>
-            <a:r>
-              <a:rPr lang="de-DE" altLang="de-DE" sz="1600" b="1" dirty="0" err="1">
+              <a:t>// </a:t>
+            </a:r>
+            <a:r>
+              <a:rPr lang="de-DE" altLang="de-DE" sz="1600" b="1" dirty="0">
                 <a:solidFill>
                   <a:srgbClr val="000000"/>
                 </a:solidFill>
                 <a:latin typeface="Courier New" pitchFamily="49" charset="0"/>
               </a:rPr>
-              <a:t>result</a:t>
-            </a:r>
-            <a:r>
+              <a:t>-&gt; Rechte 7-Segment-Anzeige komplett aus</a:t>
+            </a:r>
+            <a:br>
               <a:rPr lang="de-DE" altLang="de-DE" sz="1600" b="1" dirty="0">
                 <a:solidFill>
                   <a:srgbClr val="000000"/>
                 </a:solidFill>
                 <a:latin typeface="Courier New" pitchFamily="49" charset="0"/>
               </a:rPr>
-              <a:t>;</a:t>
-            </a:r>
-          </a:p>
-          <a:p>
-            <a:pPr algn="l" eaLnBrk="1" hangingPunct="1"/>
-            <a:endParaRPr lang="de-DE" altLang="de-DE" sz="1800" b="1" dirty="0">
+            </a:br>
+            <a:endParaRPr lang="de-DE" altLang="de-DE" sz="1600" b="1" dirty="0">
               <a:solidFill>
                 <a:srgbClr val="000000"/>
               </a:solidFill>
@@ -21994,29 +23978,29 @@
                 </a:solidFill>
                 <a:latin typeface="Courier New" pitchFamily="49" charset="0"/>
               </a:rPr>
-              <a:t>ADCS_MD   = 3;		// ADC </a:t>
-            </a:r>
-            <a:r>
-              <a:rPr lang="de-DE" altLang="de-DE" sz="1600" b="1" dirty="0" err="1">
+              <a:t>PDR00_P7 = 0;	// Pin 7 von Port 00 auf Low-Pegel</a:t>
+            </a:r>
+          </a:p>
+          <a:p>
+            <a:pPr algn="l" eaLnBrk="1" hangingPunct="1"/>
+            <a:r>
+              <a:rPr lang="de-DE" altLang="de-DE" sz="1600" b="1" dirty="0">
                 <a:solidFill>
                   <a:srgbClr val="000000"/>
                 </a:solidFill>
                 <a:latin typeface="Courier New" pitchFamily="49" charset="0"/>
               </a:rPr>
-              <a:t>Stop</a:t>
-            </a:r>
-            <a:r>
-              <a:rPr lang="de-DE" altLang="de-DE" sz="1600" b="1" dirty="0">
+              <a:t>					</a:t>
+            </a:r>
+            <a:r>
+              <a:rPr lang="de-DE" altLang="de-DE" sz="1600" b="1" dirty="0" smtClean="0">
                 <a:solidFill>
                   <a:srgbClr val="000000"/>
                 </a:solidFill>
                 <a:latin typeface="Courier New" pitchFamily="49" charset="0"/>
               </a:rPr>
-              <a:t> Modus</a:t>
-            </a:r>
-          </a:p>
-          <a:p>
-            <a:pPr algn="l" eaLnBrk="1" hangingPunct="1"/>
+              <a:t>// </a:t>
+            </a:r>
             <a:r>
               <a:rPr lang="de-DE" altLang="de-DE" sz="1600" b="1" dirty="0">
                 <a:solidFill>
@@ -22024,132 +24008,41 @@
                 </a:solidFill>
                 <a:latin typeface="Courier New" pitchFamily="49" charset="0"/>
               </a:rPr>
-              <a:t>ADCS_S10  = 1;		// 8 Bit Genauigkeit</a:t>
-            </a:r>
-          </a:p>
-          <a:p>
-            <a:pPr algn="l" eaLnBrk="1" hangingPunct="1"/>
-            <a:r>
-              <a:rPr lang="de-DE" altLang="de-DE" sz="1600" b="1" dirty="0">
-                <a:solidFill>
-                  <a:srgbClr val="000000"/>
-                </a:solidFill>
-                <a:latin typeface="Courier New" pitchFamily="49" charset="0"/>
-              </a:rPr>
-              <a:t>ADER0_ADE2 = 1;	// Analoge Eingänge aktivieren: AN2 + AN3</a:t>
-            </a:r>
-          </a:p>
-          <a:p>
-            <a:pPr algn="l" eaLnBrk="1" hangingPunct="1"/>
-            <a:r>
-              <a:rPr lang="de-DE" altLang="de-DE" sz="1600" b="1" dirty="0">
-                <a:solidFill>
-                  <a:srgbClr val="000000"/>
-                </a:solidFill>
-                <a:latin typeface="Courier New" pitchFamily="49" charset="0"/>
-              </a:rPr>
-              <a:t>ADER0_ADE3 = 1;	//  (ADER0: Eingänge AN0 bis AN7)</a:t>
-            </a:r>
-          </a:p>
-          <a:p>
-            <a:pPr algn="l" eaLnBrk="1" hangingPunct="1"/>
-            <a:endParaRPr lang="de-DE" altLang="de-DE" sz="1800" b="1" dirty="0">
-              <a:solidFill>
-                <a:srgbClr val="000000"/>
-              </a:solidFill>
-              <a:latin typeface="Courier New" pitchFamily="49" charset="0"/>
-            </a:endParaRPr>
-          </a:p>
-          <a:p>
-            <a:pPr algn="l" eaLnBrk="1" hangingPunct="1"/>
-            <a:r>
-              <a:rPr lang="de-DE" altLang="de-DE" sz="1600" b="1" dirty="0">
-                <a:solidFill>
-                  <a:srgbClr val="000000"/>
-                </a:solidFill>
-                <a:latin typeface="Courier New" pitchFamily="49" charset="0"/>
-              </a:rPr>
-              <a:t>ADSR = 0x6C00 + (3 &lt;&lt; 5) + 3;		// Start- und End-Kanal 3</a:t>
-            </a:r>
-          </a:p>
-          <a:p>
-            <a:pPr algn="l" eaLnBrk="1" hangingPunct="1"/>
-            <a:endParaRPr lang="de-DE" altLang="de-DE" sz="1800" b="1" dirty="0">
-              <a:solidFill>
-                <a:srgbClr val="000000"/>
-              </a:solidFill>
-              <a:latin typeface="Courier New" pitchFamily="49" charset="0"/>
-            </a:endParaRPr>
-          </a:p>
-          <a:p>
-            <a:pPr algn="l" eaLnBrk="1" hangingPunct="1"/>
-            <a:r>
-              <a:rPr lang="de-DE" altLang="de-DE" sz="1600" b="1" dirty="0">
-                <a:solidFill>
-                  <a:srgbClr val="000000"/>
-                </a:solidFill>
-                <a:latin typeface="Courier New" pitchFamily="49" charset="0"/>
-              </a:rPr>
-              <a:t>ADCS_STRT = 1;				// A/D-Wandler starten</a:t>
-            </a:r>
-          </a:p>
-          <a:p>
-            <a:pPr algn="l" eaLnBrk="1" hangingPunct="1"/>
-            <a:r>
-              <a:rPr lang="de-DE" altLang="de-DE" sz="1600" b="1" dirty="0" err="1">
-                <a:solidFill>
-                  <a:srgbClr val="000000"/>
-                </a:solidFill>
-                <a:latin typeface="Courier New" pitchFamily="49" charset="0"/>
-              </a:rPr>
-              <a:t>while</a:t>
-            </a:r>
-            <a:r>
-              <a:rPr lang="de-DE" altLang="de-DE" sz="1600" b="1" dirty="0">
-                <a:solidFill>
-                  <a:srgbClr val="000000"/>
-                </a:solidFill>
-                <a:latin typeface="Courier New" pitchFamily="49" charset="0"/>
-              </a:rPr>
-              <a:t> (ADCS_INT == 0) { }	// Warten bis A/D-Wandlung beendet</a:t>
-            </a:r>
-          </a:p>
-          <a:p>
-            <a:pPr algn="l" eaLnBrk="1" hangingPunct="1"/>
-            <a:r>
-              <a:rPr lang="de-DE" altLang="de-DE" sz="1600" b="1" dirty="0" err="1">
-                <a:solidFill>
-                  <a:srgbClr val="000000"/>
-                </a:solidFill>
-                <a:latin typeface="Courier New" pitchFamily="49" charset="0"/>
-              </a:rPr>
-              <a:t>result</a:t>
-            </a:r>
-            <a:r>
-              <a:rPr lang="de-DE" altLang="de-DE" sz="1600" b="1" dirty="0">
-                <a:solidFill>
-                  <a:srgbClr val="000000"/>
-                </a:solidFill>
-                <a:latin typeface="Courier New" pitchFamily="49" charset="0"/>
-              </a:rPr>
-              <a:t> = ADCRL;			// Ergebnis speichern</a:t>
-            </a:r>
-          </a:p>
-          <a:p>
-            <a:pPr algn="l" eaLnBrk="1" hangingPunct="1"/>
-            <a:r>
-              <a:rPr lang="de-DE" altLang="de-DE" sz="1600" b="1" dirty="0">
-                <a:solidFill>
-                  <a:srgbClr val="000000"/>
-                </a:solidFill>
-                <a:latin typeface="Courier New" pitchFamily="49" charset="0"/>
-              </a:rPr>
-              <a:t>ADCS_INT = 0;				// Bit auf 0 für nächste Wandlung</a:t>
+              <a:t>-&gt; Punkt der rechten 7-Segment-Anzeige an</a:t>
             </a:r>
           </a:p>
         </p:txBody>
       </p:sp>
+      <p:pic>
+        <p:nvPicPr>
+          <p:cNvPr id="2" name="Grafik 1"/>
+          <p:cNvPicPr>
+            <a:picLocks noChangeAspect="1"/>
+          </p:cNvPicPr>
+          <p:nvPr/>
+        </p:nvPicPr>
+        <p:blipFill>
+          <a:blip r:embed="rId3"/>
+          <a:stretch>
+            <a:fillRect/>
+          </a:stretch>
+        </p:blipFill>
+        <p:spPr>
+          <a:xfrm>
+            <a:off x="5652120" y="3501008"/>
+            <a:ext cx="2947381" cy="2537271"/>
+          </a:xfrm>
+          <a:prstGeom prst="rect">
+            <a:avLst/>
+          </a:prstGeom>
+        </p:spPr>
+      </p:pic>
     </p:spTree>
+    <p:extLst>
+      <p:ext uri="{BB962C8B-B14F-4D97-AF65-F5344CB8AC3E}">
+        <p14:creationId xmlns:p14="http://schemas.microsoft.com/office/powerpoint/2010/main" val="1222325295"/>
+      </p:ext>
+    </p:extLst>
   </p:cSld>
   <p:clrMapOvr>
     <a:masterClrMapping/>

</xml_diff>